<commit_message>
working on result writing and calculating. pictures are added
</commit_message>
<xml_diff>
--- a/presentation/Nagappan2005.pptx
+++ b/presentation/Nagappan2005.pptx
@@ -3592,7 +3592,7 @@
           <a:bodyPr bIns="0" lIns="0" rIns="0" tIns="0" wrap="none"/>
           <a:p>
             <a:pPr algn="r"/>
-            <a:fld id="{91F1D121-1181-4151-8100-31D1D1C1D1F1}" type="slidenum">
+            <a:fld id="{D141F131-8171-4151-B171-B121F171E171}" type="slidenum">
               <a:rPr lang="en-US" sz="1400"/>
               <a:t>&lt;number&gt;</a:t>
             </a:fld>
@@ -3866,7 +3866,7 @@
           <a:bodyPr bIns="0" lIns="0" rIns="0" tIns="0" wrap="none"/>
           <a:p>
             <a:pPr algn="r"/>
-            <a:fld id="{41D1F181-31D1-41D1-B141-C1C14171E191}" type="slidenum">
+            <a:fld id="{C1B12131-31C1-4141-9161-B1D16131D161}" type="slidenum">
               <a:rPr lang="en-US" sz="1400"/>
               <a:t>&lt;number&gt;</a:t>
             </a:fld>
@@ -4141,7 +4141,7 @@
           <a:bodyPr bIns="0" lIns="0" rIns="0" tIns="0" wrap="none"/>
           <a:p>
             <a:pPr algn="r"/>
-            <a:fld id="{A11101C1-41A1-41B1-9141-A1510151E1C1}" type="slidenum">
+            <a:fld id="{81D161C1-A121-4171-9111-C1010091E121}" type="slidenum">
               <a:rPr lang="en-US" sz="1400"/>
               <a:t>&lt;number&gt;</a:t>
             </a:fld>
@@ -4221,8 +4221,8 @@
         </p:nvSpPr>
         <p:spPr>
           <a:xfrm>
-            <a:off x="548640" y="2834640"/>
-            <a:ext cx="8870040" cy="3383280"/>
+            <a:off x="548640" y="2294640"/>
+            <a:ext cx="8870040" cy="2643120"/>
           </a:xfrm>
           <a:prstGeom prst="rect">
             <a:avLst/>
@@ -4276,8 +4276,8 @@
         </p:nvSpPr>
         <p:spPr>
           <a:xfrm>
-            <a:off x="2586960" y="7096680"/>
-            <a:ext cx="5074200" cy="354600"/>
+            <a:off x="1776240" y="4951800"/>
+            <a:ext cx="6589080" cy="1688760"/>
           </a:xfrm>
           <a:prstGeom prst="rect">
             <a:avLst/>
@@ -4286,13 +4286,90 @@
         <p:txBody>
           <a:bodyPr bIns="45000" lIns="90000" rIns="90000" tIns="45000" wrap="none"/>
           <a:p>
+            <a:pPr algn="ctr"/>
             <a:r>
               <a:rPr lang="en-US" sz="1400">
                 <a:solidFill>
                   <a:srgbClr val="e6e6e6"/>
                 </a:solidFill>
               </a:rPr>
-              <a:t>Source of reference http://dl.acm.org/citation.cfm?id=1062514</a:t>
+              <a:t>This presentation is based on the research paper published in proceedings of the</a:t>
+            </a:r>
+            <a:endParaRPr/>
+          </a:p>
+          <a:p>
+            <a:pPr algn="ctr"/>
+            <a:r>
+              <a:rPr lang="en-US" sz="1400">
+                <a:solidFill>
+                  <a:srgbClr val="e6e6e6"/>
+                </a:solidFill>
+              </a:rPr>
+              <a:t>27th international conference on Software engineering, ICSE 2005.</a:t>
+            </a:r>
+            <a:endParaRPr/>
+          </a:p>
+          <a:p>
+            <a:pPr algn="ctr"/>
+            <a:r>
+              <a:rPr lang="en-US" sz="1400">
+                <a:solidFill>
+                  <a:srgbClr val="e6e6e6"/>
+                </a:solidFill>
+              </a:rPr>
+              <a:t>New York, NY, USA ©2005</a:t>
+            </a:r>
+            <a:endParaRPr/>
+          </a:p>
+          <a:p>
+            <a:pPr algn="ctr"/>
+            <a:r>
+              <a:rPr lang="en-US" sz="1400">
+                <a:solidFill>
+                  <a:srgbClr val="e6e6e6"/>
+                </a:solidFill>
+              </a:rPr>
+              <a:t>Pages: 284-292</a:t>
+            </a:r>
+            <a:endParaRPr/>
+          </a:p>
+          <a:p>
+            <a:pPr algn="ctr"/>
+            <a:r>
+              <a:rPr lang="en-US" sz="1400">
+                <a:solidFill>
+                  <a:srgbClr val="e6e6e6"/>
+                </a:solidFill>
+              </a:rPr>
+              <a:t>ISBN:1-58113-963-2, </a:t>
+            </a:r>
+            <a:endParaRPr/>
+          </a:p>
+          <a:p>
+            <a:pPr algn="ctr"/>
+            <a:endParaRPr/>
+          </a:p>
+          <a:p>
+            <a:pPr algn="ctr"/>
+            <a:r>
+              <a:rPr lang="en-US" sz="1400">
+                <a:solidFill>
+                  <a:srgbClr val="e6e6e6"/>
+                </a:solidFill>
+              </a:rPr>
+              <a:t>Collected from the ACM Digital Library</a:t>
+            </a:r>
+            <a:endParaRPr/>
+          </a:p>
+          <a:p>
+            <a:pPr algn="ctr"/>
+            <a:r>
+              <a:rPr b="1" i="1" lang="en-US" sz="1400">
+                <a:solidFill>
+                  <a:srgbClr val="e6e6e6"/>
+                </a:solidFill>
+              </a:rPr>
+              <a:t>http://dl.acm.org/citation.cfm?id=1062514</a:t>
             </a:r>
             <a:endParaRPr/>
           </a:p>
@@ -4322,7 +4399,7 @@
       </p:grpSpPr>
       <p:sp>
         <p:nvSpPr>
-          <p:cNvPr id="169" name="TextShape 1"/>
+          <p:cNvPr id="171" name="TextShape 1"/>
           <p:cNvSpPr txBox="1"/>
           <p:nvPr/>
         </p:nvSpPr>
@@ -4353,7 +4430,7 @@
       </p:sp>
       <p:sp>
         <p:nvSpPr>
-          <p:cNvPr id="170" name="TextShape 2"/>
+          <p:cNvPr id="172" name="TextShape 2"/>
           <p:cNvSpPr txBox="1"/>
           <p:nvPr/>
         </p:nvSpPr>
@@ -4383,7 +4460,7 @@
       </p:sp>
       <p:graphicFrame>
         <p:nvGraphicFramePr>
-          <p:cNvPr id="171" name="Table 3"/>
+          <p:cNvPr id="173" name="Table 3"/>
           <p:cNvGraphicFramePr/>
           <p:nvPr/>
         </p:nvGraphicFramePr>
@@ -4847,7 +4924,7 @@
       </p:graphicFrame>
       <p:sp>
         <p:nvSpPr>
-          <p:cNvPr id="172" name="TextShape 4"/>
+          <p:cNvPr id="174" name="TextShape 4"/>
           <p:cNvSpPr txBox="1"/>
           <p:nvPr/>
         </p:nvSpPr>
@@ -4943,7 +5020,7 @@
       </p:sp>
       <p:sp>
         <p:nvSpPr>
-          <p:cNvPr id="173" name="TextShape 5"/>
+          <p:cNvPr id="175" name="TextShape 5"/>
           <p:cNvSpPr txBox="1"/>
           <p:nvPr/>
         </p:nvSpPr>
@@ -4973,7 +5050,7 @@
       </p:sp>
       <p:sp>
         <p:nvSpPr>
-          <p:cNvPr id="174" name="TextShape 6"/>
+          <p:cNvPr id="176" name="TextShape 6"/>
           <p:cNvSpPr txBox="1"/>
           <p:nvPr/>
         </p:nvSpPr>
@@ -5003,6 +5080,35 @@
       </p:sp>
     </p:spTree>
   </p:cSld>
+  <p:timing>
+    <p:tnLst>
+      <p:par>
+        <p:cTn dur="indefinite" id="68" nodeType="tmRoot" restart="never">
+          <p:childTnLst>
+            <p:seq>
+              <p:cTn id="69" nodeType="mainSeq">
+                <p:childTnLst/>
+              </p:cTn>
+              <p:prevCondLst>
+                <p:cond delay="0" evt="onPrev">
+                  <p:tgtEl>
+                    <p:sldTgt/>
+                  </p:tgtEl>
+                </p:cond>
+              </p:prevCondLst>
+              <p:nextCondLst>
+                <p:cond delay="0" evt="onNext">
+                  <p:tgtEl>
+                    <p:sldTgt/>
+                  </p:tgtEl>
+                </p:cond>
+              </p:nextCondLst>
+            </p:seq>
+          </p:childTnLst>
+        </p:cTn>
+      </p:par>
+    </p:tnLst>
+  </p:timing>
 </p:sld>
 </file>
 
@@ -5025,7 +5131,7 @@
       </p:grpSpPr>
       <p:sp>
         <p:nvSpPr>
-          <p:cNvPr id="175" name="TextShape 1"/>
+          <p:cNvPr id="177" name="TextShape 1"/>
           <p:cNvSpPr txBox="1"/>
           <p:nvPr/>
         </p:nvSpPr>
@@ -5056,7 +5162,7 @@
       </p:sp>
       <p:sp>
         <p:nvSpPr>
-          <p:cNvPr id="176" name="TextShape 2"/>
+          <p:cNvPr id="178" name="TextShape 2"/>
           <p:cNvSpPr txBox="1"/>
           <p:nvPr/>
         </p:nvSpPr>
@@ -5086,7 +5192,7 @@
       </p:sp>
       <p:sp>
         <p:nvSpPr>
-          <p:cNvPr id="177" name="TextShape 3"/>
+          <p:cNvPr id="179" name="TextShape 3"/>
           <p:cNvSpPr txBox="1"/>
           <p:nvPr/>
         </p:nvSpPr>
@@ -5116,6 +5222,35 @@
       </p:sp>
     </p:spTree>
   </p:cSld>
+  <p:timing>
+    <p:tnLst>
+      <p:par>
+        <p:cTn dur="indefinite" id="70" nodeType="tmRoot" restart="never">
+          <p:childTnLst>
+            <p:seq>
+              <p:cTn id="71" nodeType="mainSeq">
+                <p:childTnLst/>
+              </p:cTn>
+              <p:prevCondLst>
+                <p:cond delay="0" evt="onPrev">
+                  <p:tgtEl>
+                    <p:sldTgt/>
+                  </p:tgtEl>
+                </p:cond>
+              </p:prevCondLst>
+              <p:nextCondLst>
+                <p:cond delay="0" evt="onNext">
+                  <p:tgtEl>
+                    <p:sldTgt/>
+                  </p:tgtEl>
+                </p:cond>
+              </p:nextCondLst>
+            </p:seq>
+          </p:childTnLst>
+        </p:cTn>
+      </p:par>
+    </p:tnLst>
+  </p:timing>
 </p:sld>
 </file>
 
@@ -5138,7 +5273,7 @@
       </p:grpSpPr>
       <p:sp>
         <p:nvSpPr>
-          <p:cNvPr id="178" name="TextShape 1"/>
+          <p:cNvPr id="180" name="TextShape 1"/>
           <p:cNvSpPr txBox="1"/>
           <p:nvPr/>
         </p:nvSpPr>
@@ -5165,7 +5300,7 @@
       </p:sp>
       <p:sp>
         <p:nvSpPr>
-          <p:cNvPr id="179" name="TextShape 2"/>
+          <p:cNvPr id="181" name="TextShape 2"/>
           <p:cNvSpPr txBox="1"/>
           <p:nvPr/>
         </p:nvSpPr>
@@ -5196,7 +5331,7 @@
       </p:sp>
       <p:pic>
         <p:nvPicPr>
-          <p:cNvPr descr="" id="180" name=""/>
+          <p:cNvPr descr="" id="182" name=""/>
           <p:cNvPicPr/>
           <p:nvPr/>
         </p:nvPicPr>
@@ -5218,7 +5353,7 @@
       </p:pic>
       <p:pic>
         <p:nvPicPr>
-          <p:cNvPr descr="" id="181" name=""/>
+          <p:cNvPr descr="" id="183" name=""/>
           <p:cNvPicPr/>
           <p:nvPr/>
         </p:nvPicPr>
@@ -5240,7 +5375,7 @@
       </p:pic>
       <p:sp>
         <p:nvSpPr>
-          <p:cNvPr id="182" name="TextShape 3"/>
+          <p:cNvPr id="184" name="TextShape 3"/>
           <p:cNvSpPr txBox="1"/>
           <p:nvPr/>
         </p:nvSpPr>
@@ -5270,7 +5405,7 @@
       </p:sp>
       <p:sp>
         <p:nvSpPr>
-          <p:cNvPr id="183" name="TextShape 4"/>
+          <p:cNvPr id="185" name="TextShape 4"/>
           <p:cNvSpPr txBox="1"/>
           <p:nvPr/>
         </p:nvSpPr>
@@ -5300,7 +5435,7 @@
       </p:sp>
       <p:graphicFrame>
         <p:nvGraphicFramePr>
-          <p:cNvPr id="184" name="Table 5"/>
+          <p:cNvPr id="186" name="Table 5"/>
           <p:cNvGraphicFramePr/>
           <p:nvPr/>
         </p:nvGraphicFramePr>
@@ -5544,7 +5679,7 @@
       </p:graphicFrame>
       <p:sp>
         <p:nvSpPr>
-          <p:cNvPr id="185" name="TextShape 6"/>
+          <p:cNvPr id="187" name="TextShape 6"/>
           <p:cNvSpPr txBox="1"/>
           <p:nvPr/>
         </p:nvSpPr>
@@ -5574,7 +5709,7 @@
       </p:sp>
       <p:sp>
         <p:nvSpPr>
-          <p:cNvPr id="186" name="TextShape 7"/>
+          <p:cNvPr id="188" name="TextShape 7"/>
           <p:cNvSpPr txBox="1"/>
           <p:nvPr/>
         </p:nvSpPr>
@@ -5604,7 +5739,7 @@
       </p:sp>
       <p:graphicFrame>
         <p:nvGraphicFramePr>
-          <p:cNvPr id="187" name="Table 8"/>
+          <p:cNvPr id="189" name="Table 8"/>
           <p:cNvGraphicFramePr/>
           <p:nvPr/>
         </p:nvGraphicFramePr>
@@ -5791,7 +5926,7 @@
       </p:graphicFrame>
       <p:sp>
         <p:nvSpPr>
-          <p:cNvPr id="188" name="TextShape 9"/>
+          <p:cNvPr id="190" name="TextShape 9"/>
           <p:cNvSpPr txBox="1"/>
           <p:nvPr/>
         </p:nvSpPr>
@@ -5821,776 +5956,13 @@
       </p:sp>
     </p:spTree>
   </p:cSld>
-</p:sld>
-</file>
-
-<file path=ppt/slides/slide13.xml><?xml version="1.0" encoding="utf-8"?>
-<p:sld xmlns:a="http://schemas.openxmlformats.org/drawingml/2006/main" xmlns:p="http://schemas.openxmlformats.org/presentationml/2006/main" xmlns:r="http://schemas.openxmlformats.org/officeDocument/2006/relationships">
-  <p:cSld>
-    <p:spTree>
-      <p:nvGrpSpPr>
-        <p:cNvPr id="1" name=""/>
-        <p:cNvGrpSpPr/>
-        <p:nvPr/>
-      </p:nvGrpSpPr>
-      <p:grpSpPr>
-        <a:xfrm>
-          <a:off x="0" y="0"/>
-          <a:ext cx="0" cy="0"/>
-          <a:chOff x="0" y="0"/>
-          <a:chExt cx="0" cy="0"/>
-        </a:xfrm>
-      </p:grpSpPr>
-      <p:sp>
-        <p:nvSpPr>
-          <p:cNvPr id="189" name="TextShape 1"/>
-          <p:cNvSpPr txBox="1"/>
-          <p:nvPr/>
-        </p:nvSpPr>
-        <p:spPr>
-          <a:xfrm>
-            <a:off x="504000" y="337320"/>
-            <a:ext cx="9071640" cy="1262160"/>
-          </a:xfrm>
-          <a:prstGeom prst="rect">
-            <a:avLst/>
-          </a:prstGeom>
-        </p:spPr>
-        <p:txBody>
-          <a:bodyPr anchor="ctr" bIns="0" lIns="0" rIns="0" tIns="0" wrap="none"/>
-          <a:p>
-            <a:pPr algn="ctr"/>
-            <a:r>
-              <a:rPr lang="en-US"/>
-              <a:t>Defect Density Prediction </a:t>
-            </a:r>
-            <a:r>
-              <a:rPr lang="en-US" sz="2000"/>
-              <a:t>Continued...</a:t>
-            </a:r>
-            <a:endParaRPr/>
-          </a:p>
-        </p:txBody>
-      </p:sp>
-      <p:sp>
-        <p:nvSpPr>
-          <p:cNvPr id="190" name="TextShape 2"/>
-          <p:cNvSpPr txBox="1"/>
-          <p:nvPr/>
-        </p:nvSpPr>
-        <p:spPr>
-          <a:xfrm>
-            <a:off x="396000" y="1815480"/>
-            <a:ext cx="7176960" cy="346320"/>
-          </a:xfrm>
-          <a:prstGeom prst="rect">
-            <a:avLst/>
-          </a:prstGeom>
-        </p:spPr>
-        <p:txBody>
-          <a:bodyPr bIns="45000" lIns="90000" rIns="90000" tIns="45000" wrap="none"/>
-          <a:p>
-            <a:r>
-              <a:rPr lang="en-US">
-                <a:solidFill>
-                  <a:srgbClr val="ffffff"/>
-                </a:solidFill>
-              </a:rPr>
-              <a:t>Random splits data fit</a:t>
-            </a:r>
-            <a:endParaRPr/>
-          </a:p>
-        </p:txBody>
-      </p:sp>
-      <p:sp>
-        <p:nvSpPr>
-          <p:cNvPr id="191" name="TextShape 3"/>
-          <p:cNvSpPr txBox="1"/>
-          <p:nvPr/>
-        </p:nvSpPr>
-        <p:spPr>
-          <a:xfrm>
-            <a:off x="2586960" y="7096680"/>
-            <a:ext cx="5074200" cy="354600"/>
-          </a:xfrm>
-          <a:prstGeom prst="rect">
-            <a:avLst/>
-          </a:prstGeom>
-        </p:spPr>
-        <p:txBody>
-          <a:bodyPr bIns="45000" lIns="90000" rIns="90000" tIns="45000" wrap="none"/>
-          <a:p>
-            <a:r>
-              <a:rPr lang="en-US" sz="1400">
-                <a:solidFill>
-                  <a:srgbClr val="e6e6e6"/>
-                </a:solidFill>
-              </a:rPr>
-              <a:t>Source of reference http://dl.acm.org/citation.cfm?id=1062514</a:t>
-            </a:r>
-            <a:endParaRPr/>
-          </a:p>
-        </p:txBody>
-      </p:sp>
-    </p:spTree>
-  </p:cSld>
-</p:sld>
-</file>
-
-<file path=ppt/slides/slide14.xml><?xml version="1.0" encoding="utf-8"?>
-<p:sld xmlns:a="http://schemas.openxmlformats.org/drawingml/2006/main" xmlns:p="http://schemas.openxmlformats.org/presentationml/2006/main" xmlns:r="http://schemas.openxmlformats.org/officeDocument/2006/relationships">
-  <p:cSld>
-    <p:spTree>
-      <p:nvGrpSpPr>
-        <p:cNvPr id="1" name=""/>
-        <p:cNvGrpSpPr/>
-        <p:nvPr/>
-      </p:nvGrpSpPr>
-      <p:grpSpPr>
-        <a:xfrm>
-          <a:off x="0" y="0"/>
-          <a:ext cx="0" cy="0"/>
-          <a:chOff x="0" y="0"/>
-          <a:chExt cx="0" cy="0"/>
-        </a:xfrm>
-      </p:grpSpPr>
-      <p:sp>
-        <p:nvSpPr>
-          <p:cNvPr id="192" name="TextShape 1"/>
-          <p:cNvSpPr txBox="1"/>
-          <p:nvPr/>
-        </p:nvSpPr>
-        <p:spPr>
-          <a:xfrm>
-            <a:off x="504000" y="301320"/>
-            <a:ext cx="9071640" cy="1262160"/>
-          </a:xfrm>
-          <a:prstGeom prst="rect">
-            <a:avLst/>
-          </a:prstGeom>
-        </p:spPr>
-        <p:txBody>
-          <a:bodyPr anchor="ctr" bIns="0" lIns="0" rIns="0" tIns="0" wrap="none"/>
-          <a:p>
-            <a:pPr algn="ctr"/>
-            <a:r>
-              <a:rPr lang="en-US"/>
-              <a:t>Limitations</a:t>
-            </a:r>
-            <a:endParaRPr/>
-          </a:p>
-        </p:txBody>
-      </p:sp>
-      <p:sp>
-        <p:nvSpPr>
-          <p:cNvPr id="193" name="TextShape 2"/>
-          <p:cNvSpPr txBox="1"/>
-          <p:nvPr/>
-        </p:nvSpPr>
-        <p:spPr>
-          <a:xfrm>
-            <a:off x="504000" y="1769040"/>
-            <a:ext cx="9071640" cy="4384800"/>
-          </a:xfrm>
-          <a:prstGeom prst="rect">
-            <a:avLst/>
-          </a:prstGeom>
-        </p:spPr>
-        <p:txBody>
-          <a:bodyPr bIns="0" lIns="0" rIns="0" tIns="0" wrap="none"/>
-          <a:p>
-            <a:pPr>
-              <a:buSzPct val="45000"/>
-              <a:buFont typeface="StarSymbol"/>
-              <a:buChar char=""/>
-            </a:pPr>
-            <a:r>
-              <a:rPr lang="en-US"/>
-              <a:t>Internal Validity:</a:t>
-            </a:r>
-            <a:endParaRPr/>
-          </a:p>
-          <a:p>
-            <a:pPr lvl="1">
-              <a:buSzPct val="75000"/>
-              <a:buFont typeface="StarSymbol"/>
-              <a:buChar char=""/>
-            </a:pPr>
-            <a:r>
-              <a:rPr lang="en-US"/>
-              <a:t>Inflating “Weeks of Churn” measure</a:t>
-            </a:r>
-            <a:endParaRPr/>
-          </a:p>
-          <a:p>
-            <a:pPr>
-              <a:buSzPct val="45000"/>
-              <a:buFont typeface="StarSymbol"/>
-              <a:buChar char=""/>
-            </a:pPr>
-            <a:r>
-              <a:rPr lang="en-US"/>
-              <a:t>External Validity:</a:t>
-            </a:r>
-            <a:endParaRPr/>
-          </a:p>
-          <a:p>
-            <a:pPr lvl="1">
-              <a:buSzPct val="75000"/>
-              <a:buFont typeface="StarSymbol"/>
-              <a:buChar char=""/>
-            </a:pPr>
-            <a:r>
-              <a:rPr lang="en-US"/>
-              <a:t>Different sized softwares may be incomparable</a:t>
-            </a:r>
-            <a:endParaRPr/>
-          </a:p>
-        </p:txBody>
-      </p:sp>
-      <p:sp>
-        <p:nvSpPr>
-          <p:cNvPr id="194" name="TextShape 3"/>
-          <p:cNvSpPr txBox="1"/>
-          <p:nvPr/>
-        </p:nvSpPr>
-        <p:spPr>
-          <a:xfrm>
-            <a:off x="2586960" y="7096680"/>
-            <a:ext cx="5074200" cy="354600"/>
-          </a:xfrm>
-          <a:prstGeom prst="rect">
-            <a:avLst/>
-          </a:prstGeom>
-        </p:spPr>
-        <p:txBody>
-          <a:bodyPr bIns="45000" lIns="90000" rIns="90000" tIns="45000" wrap="none"/>
-          <a:p>
-            <a:r>
-              <a:rPr lang="en-US" sz="1400">
-                <a:solidFill>
-                  <a:srgbClr val="e6e6e6"/>
-                </a:solidFill>
-              </a:rPr>
-              <a:t>Source of reference http://dl.acm.org/citation.cfm?id=1062514</a:t>
-            </a:r>
-            <a:endParaRPr/>
-          </a:p>
-        </p:txBody>
-      </p:sp>
-    </p:spTree>
-  </p:cSld>
-</p:sld>
-</file>
-
-<file path=ppt/slides/slide15.xml><?xml version="1.0" encoding="utf-8"?>
-<p:sld xmlns:a="http://schemas.openxmlformats.org/drawingml/2006/main" xmlns:p="http://schemas.openxmlformats.org/presentationml/2006/main" xmlns:r="http://schemas.openxmlformats.org/officeDocument/2006/relationships">
-  <p:cSld>
-    <p:spTree>
-      <p:nvGrpSpPr>
-        <p:cNvPr id="1" name=""/>
-        <p:cNvGrpSpPr/>
-        <p:nvPr/>
-      </p:nvGrpSpPr>
-      <p:grpSpPr>
-        <a:xfrm>
-          <a:off x="0" y="0"/>
-          <a:ext cx="0" cy="0"/>
-          <a:chOff x="0" y="0"/>
-          <a:chExt cx="0" cy="0"/>
-        </a:xfrm>
-      </p:grpSpPr>
-      <p:sp>
-        <p:nvSpPr>
-          <p:cNvPr id="195" name="TextShape 1"/>
-          <p:cNvSpPr txBox="1"/>
-          <p:nvPr/>
-        </p:nvSpPr>
-        <p:spPr>
-          <a:xfrm>
-            <a:off x="504000" y="301320"/>
-            <a:ext cx="9071640" cy="1262160"/>
-          </a:xfrm>
-          <a:prstGeom prst="rect">
-            <a:avLst/>
-          </a:prstGeom>
-        </p:spPr>
-        <p:txBody>
-          <a:bodyPr anchor="ctr" bIns="0" lIns="0" rIns="0" tIns="0" wrap="none"/>
-          <a:p>
-            <a:pPr algn="ctr"/>
-            <a:r>
-              <a:rPr lang="en-US"/>
-              <a:t>Criticism</a:t>
-            </a:r>
-            <a:endParaRPr/>
-          </a:p>
-        </p:txBody>
-      </p:sp>
-      <p:sp>
-        <p:nvSpPr>
-          <p:cNvPr id="196" name="TextShape 2"/>
-          <p:cNvSpPr txBox="1"/>
-          <p:nvPr/>
-        </p:nvSpPr>
-        <p:spPr>
-          <a:xfrm>
-            <a:off x="504000" y="1769040"/>
-            <a:ext cx="9071640" cy="3168720"/>
-          </a:xfrm>
-          <a:prstGeom prst="rect">
-            <a:avLst/>
-          </a:prstGeom>
-        </p:spPr>
-        <p:txBody>
-          <a:bodyPr bIns="0" lIns="0" rIns="0" tIns="0" wrap="none"/>
-          <a:p>
-            <a:pPr>
-              <a:buSzPct val="45000"/>
-              <a:buFont typeface="StarSymbol"/>
-              <a:buChar char=""/>
-            </a:pPr>
-            <a:r>
-              <a:rPr lang="en-US"/>
-              <a:t>New developers working creates potential bugs inside the code but not as a detected bug.</a:t>
-            </a:r>
-            <a:endParaRPr/>
-          </a:p>
-          <a:p>
-            <a:pPr>
-              <a:buSzPct val="45000"/>
-              <a:buFont typeface="StarSymbol"/>
-              <a:buChar char=""/>
-            </a:pPr>
-            <a:r>
-              <a:rPr lang="en-US"/>
-              <a:t>Newer developer's codes (in-house or OSS) need to be reviewed.</a:t>
-            </a:r>
-            <a:endParaRPr/>
-          </a:p>
-          <a:p>
-            <a:pPr>
-              <a:buSzPct val="45000"/>
-              <a:buFont typeface="StarSymbol"/>
-              <a:buChar char=""/>
-            </a:pPr>
-            <a:r>
-              <a:rPr lang="en-US"/>
-              <a:t>Churns may occur due to code-review feedbacks not only from bug-fix or new feature.</a:t>
-            </a:r>
-            <a:endParaRPr/>
-          </a:p>
-        </p:txBody>
-      </p:sp>
-      <p:pic>
-        <p:nvPicPr>
-          <p:cNvPr descr="" id="197" name=""/>
-          <p:cNvPicPr/>
-          <p:nvPr/>
-        </p:nvPicPr>
-        <p:blipFill>
-          <a:blip r:embed="rId1"/>
-          <a:stretch>
-            <a:fillRect/>
-          </a:stretch>
-        </p:blipFill>
-        <p:spPr>
-          <a:xfrm>
-            <a:off x="7370640" y="4928760"/>
-            <a:ext cx="2395080" cy="2242440"/>
-          </a:xfrm>
-          <a:prstGeom prst="rect">
-            <a:avLst/>
-          </a:prstGeom>
-        </p:spPr>
-      </p:pic>
-      <p:sp>
-        <p:nvSpPr>
-          <p:cNvPr id="198" name="TextShape 3"/>
-          <p:cNvSpPr txBox="1"/>
-          <p:nvPr/>
-        </p:nvSpPr>
-        <p:spPr>
-          <a:xfrm>
-            <a:off x="2586960" y="7096680"/>
-            <a:ext cx="5074200" cy="354600"/>
-          </a:xfrm>
-          <a:prstGeom prst="rect">
-            <a:avLst/>
-          </a:prstGeom>
-        </p:spPr>
-        <p:txBody>
-          <a:bodyPr bIns="45000" lIns="90000" rIns="90000" tIns="45000" wrap="none"/>
-          <a:p>
-            <a:r>
-              <a:rPr lang="en-US" sz="1400">
-                <a:solidFill>
-                  <a:srgbClr val="e6e6e6"/>
-                </a:solidFill>
-              </a:rPr>
-              <a:t>Source of reference http://dl.acm.org/citation.cfm?id=1062514</a:t>
-            </a:r>
-            <a:endParaRPr/>
-          </a:p>
-        </p:txBody>
-      </p:sp>
-    </p:spTree>
-  </p:cSld>
-</p:sld>
-</file>
-
-<file path=ppt/slides/slide16.xml><?xml version="1.0" encoding="utf-8"?>
-<p:sld xmlns:a="http://schemas.openxmlformats.org/drawingml/2006/main" xmlns:p="http://schemas.openxmlformats.org/presentationml/2006/main" xmlns:r="http://schemas.openxmlformats.org/officeDocument/2006/relationships">
-  <p:cSld>
-    <p:spTree>
-      <p:nvGrpSpPr>
-        <p:cNvPr id="1" name=""/>
-        <p:cNvGrpSpPr/>
-        <p:nvPr/>
-      </p:nvGrpSpPr>
-      <p:grpSpPr>
-        <a:xfrm>
-          <a:off x="0" y="0"/>
-          <a:ext cx="0" cy="0"/>
-          <a:chOff x="0" y="0"/>
-          <a:chExt cx="0" cy="0"/>
-        </a:xfrm>
-      </p:grpSpPr>
-      <p:sp>
-        <p:nvSpPr>
-          <p:cNvPr id="199" name="TextShape 1"/>
-          <p:cNvSpPr txBox="1"/>
-          <p:nvPr/>
-        </p:nvSpPr>
-        <p:spPr>
-          <a:xfrm>
-            <a:off x="504000" y="301320"/>
-            <a:ext cx="9071640" cy="1262160"/>
-          </a:xfrm>
-          <a:prstGeom prst="rect">
-            <a:avLst/>
-          </a:prstGeom>
-        </p:spPr>
-        <p:txBody>
-          <a:bodyPr anchor="ctr" bIns="0" lIns="0" rIns="0" tIns="0" wrap="none"/>
-          <a:p>
-            <a:pPr algn="ctr"/>
-            <a:r>
-              <a:rPr lang="en-US"/>
-              <a:t>Conclusion</a:t>
-            </a:r>
-            <a:endParaRPr/>
-          </a:p>
-        </p:txBody>
-      </p:sp>
-      <p:sp>
-        <p:nvSpPr>
-          <p:cNvPr id="200" name="TextShape 2"/>
-          <p:cNvSpPr txBox="1"/>
-          <p:nvPr/>
-        </p:nvSpPr>
-        <p:spPr>
-          <a:xfrm>
-            <a:off x="504000" y="1769040"/>
-            <a:ext cx="9071640" cy="4384800"/>
-          </a:xfrm>
-          <a:prstGeom prst="rect">
-            <a:avLst/>
-          </a:prstGeom>
-        </p:spPr>
-        <p:txBody>
-          <a:bodyPr bIns="0" lIns="0" rIns="0" tIns="0" wrap="none"/>
-          <a:p>
-            <a:pPr>
-              <a:buSzPct val="45000"/>
-              <a:buFont typeface="StarSymbol"/>
-              <a:buChar char=""/>
-            </a:pPr>
-            <a:r>
-              <a:rPr lang="en-US"/>
-              <a:t>Relative code-churn measures are better predictor</a:t>
-            </a:r>
-            <a:endParaRPr/>
-          </a:p>
-          <a:p>
-            <a:pPr>
-              <a:buSzPct val="45000"/>
-              <a:buFont typeface="StarSymbol"/>
-              <a:buChar char=""/>
-            </a:pPr>
-            <a:r>
-              <a:rPr lang="en-US"/>
-              <a:t>Increase in this measure is accompained by an increase in system defect density.</a:t>
-            </a:r>
-            <a:endParaRPr/>
-          </a:p>
-        </p:txBody>
-      </p:sp>
-      <p:pic>
-        <p:nvPicPr>
-          <p:cNvPr descr="" id="201" name=""/>
-          <p:cNvPicPr/>
-          <p:nvPr/>
-        </p:nvPicPr>
-        <p:blipFill>
-          <a:blip r:embed="rId1"/>
-          <a:stretch>
-            <a:fillRect/>
-          </a:stretch>
-        </p:blipFill>
-        <p:spPr>
-          <a:xfrm>
-            <a:off x="6675120" y="4266720"/>
-            <a:ext cx="3055320" cy="2594160"/>
-          </a:xfrm>
-          <a:prstGeom prst="rect">
-            <a:avLst/>
-          </a:prstGeom>
-        </p:spPr>
-      </p:pic>
-      <p:sp>
-        <p:nvSpPr>
-          <p:cNvPr id="202" name="TextShape 3"/>
-          <p:cNvSpPr txBox="1"/>
-          <p:nvPr/>
-        </p:nvSpPr>
-        <p:spPr>
-          <a:xfrm>
-            <a:off x="2586960" y="7096680"/>
-            <a:ext cx="5074200" cy="354600"/>
-          </a:xfrm>
-          <a:prstGeom prst="rect">
-            <a:avLst/>
-          </a:prstGeom>
-        </p:spPr>
-        <p:txBody>
-          <a:bodyPr bIns="45000" lIns="90000" rIns="90000" tIns="45000" wrap="none"/>
-          <a:p>
-            <a:r>
-              <a:rPr lang="en-US" sz="1400">
-                <a:solidFill>
-                  <a:srgbClr val="e6e6e6"/>
-                </a:solidFill>
-              </a:rPr>
-              <a:t>Source of reference http://dl.acm.org/citation.cfm?id=1062514</a:t>
-            </a:r>
-            <a:endParaRPr/>
-          </a:p>
-        </p:txBody>
-      </p:sp>
-    </p:spTree>
-  </p:cSld>
-</p:sld>
-</file>
-
-<file path=ppt/slides/slide2.xml><?xml version="1.0" encoding="utf-8"?>
-<p:sld xmlns:a="http://schemas.openxmlformats.org/drawingml/2006/main" xmlns:p="http://schemas.openxmlformats.org/presentationml/2006/main" xmlns:r="http://schemas.openxmlformats.org/officeDocument/2006/relationships">
-  <p:cSld>
-    <p:spTree>
-      <p:nvGrpSpPr>
-        <p:cNvPr id="1" name=""/>
-        <p:cNvGrpSpPr/>
-        <p:nvPr/>
-      </p:nvGrpSpPr>
-      <p:grpSpPr>
-        <a:xfrm>
-          <a:off x="0" y="0"/>
-          <a:ext cx="0" cy="0"/>
-          <a:chOff x="0" y="0"/>
-          <a:chExt cx="0" cy="0"/>
-        </a:xfrm>
-      </p:grpSpPr>
-      <p:sp>
-        <p:nvSpPr>
-          <p:cNvPr id="114" name="TextShape 1"/>
-          <p:cNvSpPr txBox="1"/>
-          <p:nvPr/>
-        </p:nvSpPr>
-        <p:spPr>
-          <a:xfrm>
-            <a:off x="504000" y="301320"/>
-            <a:ext cx="9071640" cy="1262160"/>
-          </a:xfrm>
-          <a:prstGeom prst="rect">
-            <a:avLst/>
-          </a:prstGeom>
-        </p:spPr>
-        <p:txBody>
-          <a:bodyPr anchor="ctr" bIns="0" lIns="0" rIns="0" tIns="0" wrap="none"/>
-          <a:p>
-            <a:pPr algn="ctr"/>
-            <a:r>
-              <a:rPr lang="en-US"/>
-              <a:t>Overall Idea</a:t>
-            </a:r>
-            <a:endParaRPr/>
-          </a:p>
-        </p:txBody>
-      </p:sp>
-      <p:sp>
-        <p:nvSpPr>
-          <p:cNvPr id="115" name="TextShape 2"/>
-          <p:cNvSpPr txBox="1"/>
-          <p:nvPr/>
-        </p:nvSpPr>
-        <p:spPr>
-          <a:xfrm>
-            <a:off x="504000" y="1769040"/>
-            <a:ext cx="8870040" cy="4294440"/>
-          </a:xfrm>
-          <a:prstGeom prst="rect">
-            <a:avLst/>
-          </a:prstGeom>
-        </p:spPr>
-        <p:txBody>
-          <a:bodyPr bIns="0" lIns="0" rIns="0" tIns="0" wrap="none"/>
-          <a:p>
-            <a:pPr>
-              <a:buSzPct val="45000"/>
-              <a:buFont typeface="StarSymbol"/>
-              <a:buChar char=""/>
-            </a:pPr>
-            <a:r>
-              <a:rPr lang="en-US" sz="2800"/>
-              <a:t>Early prediction of System Defect Density</a:t>
-            </a:r>
-            <a:endParaRPr/>
-          </a:p>
-          <a:p>
-            <a:pPr>
-              <a:buSzPct val="45000"/>
-              <a:buFont typeface="StarSymbol"/>
-              <a:buChar char=""/>
-            </a:pPr>
-            <a:r>
-              <a:rPr lang="en-US" sz="2800"/>
-              <a:t>Using set of relative code churn measures</a:t>
-            </a:r>
-            <a:endParaRPr/>
-          </a:p>
-          <a:p>
-            <a:pPr>
-              <a:buSzPct val="45000"/>
-              <a:buFont typeface="StarSymbol"/>
-              <a:buChar char=""/>
-            </a:pPr>
-            <a:r>
-              <a:rPr lang="en-US" sz="2800"/>
-              <a:t>Showing that this measure is more predictive than A</a:t>
-            </a:r>
-            <a:r>
-              <a:rPr b="1" lang="en-US" sz="2800"/>
-              <a:t>bsolute Measures</a:t>
-            </a:r>
-            <a:r>
-              <a:rPr lang="en-US" sz="2800"/>
-              <a:t> of code churn</a:t>
-            </a:r>
-            <a:endParaRPr/>
-          </a:p>
-          <a:p>
-            <a:pPr>
-              <a:buSzPct val="45000"/>
-              <a:buFont typeface="StarSymbol"/>
-              <a:buChar char=""/>
-            </a:pPr>
-            <a:r>
-              <a:rPr lang="en-US" sz="2800"/>
-              <a:t>Case study on Windows Server 2003 for validity.</a:t>
-            </a:r>
-            <a:endParaRPr/>
-          </a:p>
-          <a:p>
-            <a:pPr>
-              <a:buSzPct val="45000"/>
-              <a:buFont typeface="StarSymbol"/>
-              <a:buChar char=""/>
-            </a:pPr>
-            <a:endParaRPr/>
-          </a:p>
-          <a:p>
-            <a:pPr>
-              <a:buSzPct val="45000"/>
-              <a:buFont typeface="StarSymbol"/>
-              <a:buChar char=""/>
-            </a:pPr>
-            <a:r>
-              <a:rPr lang="en-US" sz="2800"/>
-              <a:t>Accuracy is </a:t>
-            </a:r>
-            <a:r>
-              <a:rPr b="1" lang="en-US" sz="2800"/>
-              <a:t>89.0</a:t>
-            </a:r>
-            <a:r>
-              <a:rPr lang="en-US" sz="2800"/>
-              <a:t>%</a:t>
-            </a:r>
-            <a:endParaRPr/>
-          </a:p>
-        </p:txBody>
-      </p:sp>
-      <p:pic>
-        <p:nvPicPr>
-          <p:cNvPr descr="" id="116" name=""/>
-          <p:cNvPicPr/>
-          <p:nvPr/>
-        </p:nvPicPr>
-        <p:blipFill>
-          <a:blip r:embed="rId1"/>
-          <a:stretch>
-            <a:fillRect/>
-          </a:stretch>
-        </p:blipFill>
-        <p:spPr>
-          <a:xfrm>
-            <a:off x="6652800" y="4408560"/>
-            <a:ext cx="2936880" cy="2020320"/>
-          </a:xfrm>
-          <a:prstGeom prst="rect">
-            <a:avLst/>
-          </a:prstGeom>
-        </p:spPr>
-      </p:pic>
-      <p:sp>
-        <p:nvSpPr>
-          <p:cNvPr id="117" name="TextShape 3"/>
-          <p:cNvSpPr txBox="1"/>
-          <p:nvPr/>
-        </p:nvSpPr>
-        <p:spPr>
-          <a:xfrm>
-            <a:off x="2586960" y="7096680"/>
-            <a:ext cx="5074200" cy="354600"/>
-          </a:xfrm>
-          <a:prstGeom prst="rect">
-            <a:avLst/>
-          </a:prstGeom>
-        </p:spPr>
-        <p:txBody>
-          <a:bodyPr bIns="45000" lIns="90000" rIns="90000" tIns="45000" wrap="none"/>
-          <a:p>
-            <a:r>
-              <a:rPr lang="en-US" sz="1400">
-                <a:solidFill>
-                  <a:srgbClr val="e6e6e6"/>
-                </a:solidFill>
-              </a:rPr>
-              <a:t>Source of reference http://dl.acm.org/citation.cfm?id=1062514</a:t>
-            </a:r>
-            <a:endParaRPr/>
-          </a:p>
-        </p:txBody>
-      </p:sp>
-    </p:spTree>
-  </p:cSld>
   <p:timing>
     <p:tnLst>
       <p:par>
-        <p:cTn dur="indefinite" id="1" nodeType="tmRoot" restart="never">
+        <p:cTn dur="indefinite" id="72" nodeType="tmRoot" restart="never">
           <p:childTnLst>
             <p:seq>
-              <p:cTn id="2" nodeType="mainSeq">
+              <p:cTn id="73" nodeType="mainSeq">
                 <p:childTnLst/>
               </p:cTn>
               <p:prevCondLst>
@@ -6616,6 +5988,827 @@
 </p:sld>
 </file>
 
+<file path=ppt/slides/slide13.xml><?xml version="1.0" encoding="utf-8"?>
+<p:sld xmlns:a="http://schemas.openxmlformats.org/drawingml/2006/main" xmlns:p="http://schemas.openxmlformats.org/presentationml/2006/main" xmlns:r="http://schemas.openxmlformats.org/officeDocument/2006/relationships">
+  <p:cSld>
+    <p:spTree>
+      <p:nvGrpSpPr>
+        <p:cNvPr id="1" name=""/>
+        <p:cNvGrpSpPr/>
+        <p:nvPr/>
+      </p:nvGrpSpPr>
+      <p:grpSpPr>
+        <a:xfrm>
+          <a:off x="0" y="0"/>
+          <a:ext cx="0" cy="0"/>
+          <a:chOff x="0" y="0"/>
+          <a:chExt cx="0" cy="0"/>
+        </a:xfrm>
+      </p:grpSpPr>
+      <p:sp>
+        <p:nvSpPr>
+          <p:cNvPr id="191" name="TextShape 1"/>
+          <p:cNvSpPr txBox="1"/>
+          <p:nvPr/>
+        </p:nvSpPr>
+        <p:spPr>
+          <a:xfrm>
+            <a:off x="504000" y="337320"/>
+            <a:ext cx="9071640" cy="1262160"/>
+          </a:xfrm>
+          <a:prstGeom prst="rect">
+            <a:avLst/>
+          </a:prstGeom>
+        </p:spPr>
+        <p:txBody>
+          <a:bodyPr anchor="ctr" bIns="0" lIns="0" rIns="0" tIns="0" wrap="none"/>
+          <a:p>
+            <a:pPr algn="ctr"/>
+            <a:r>
+              <a:rPr lang="en-US"/>
+              <a:t>Defect Density Prediction </a:t>
+            </a:r>
+            <a:r>
+              <a:rPr lang="en-US" sz="2000"/>
+              <a:t>Continued...</a:t>
+            </a:r>
+            <a:endParaRPr/>
+          </a:p>
+        </p:txBody>
+      </p:sp>
+      <p:sp>
+        <p:nvSpPr>
+          <p:cNvPr id="192" name="TextShape 2"/>
+          <p:cNvSpPr txBox="1"/>
+          <p:nvPr/>
+        </p:nvSpPr>
+        <p:spPr>
+          <a:xfrm>
+            <a:off x="396000" y="1815480"/>
+            <a:ext cx="7176960" cy="346320"/>
+          </a:xfrm>
+          <a:prstGeom prst="rect">
+            <a:avLst/>
+          </a:prstGeom>
+        </p:spPr>
+        <p:txBody>
+          <a:bodyPr bIns="45000" lIns="90000" rIns="90000" tIns="45000" wrap="none"/>
+          <a:p>
+            <a:r>
+              <a:rPr lang="en-US">
+                <a:solidFill>
+                  <a:srgbClr val="ffffff"/>
+                </a:solidFill>
+              </a:rPr>
+              <a:t>Random splits data fit</a:t>
+            </a:r>
+            <a:endParaRPr/>
+          </a:p>
+        </p:txBody>
+      </p:sp>
+      <p:sp>
+        <p:nvSpPr>
+          <p:cNvPr id="193" name="TextShape 3"/>
+          <p:cNvSpPr txBox="1"/>
+          <p:nvPr/>
+        </p:nvSpPr>
+        <p:spPr>
+          <a:xfrm>
+            <a:off x="2586960" y="7096680"/>
+            <a:ext cx="5074200" cy="354600"/>
+          </a:xfrm>
+          <a:prstGeom prst="rect">
+            <a:avLst/>
+          </a:prstGeom>
+        </p:spPr>
+        <p:txBody>
+          <a:bodyPr bIns="45000" lIns="90000" rIns="90000" tIns="45000" wrap="none"/>
+          <a:p>
+            <a:r>
+              <a:rPr lang="en-US" sz="1400">
+                <a:solidFill>
+                  <a:srgbClr val="e6e6e6"/>
+                </a:solidFill>
+              </a:rPr>
+              <a:t>Source of reference http://dl.acm.org/citation.cfm?id=1062514</a:t>
+            </a:r>
+            <a:endParaRPr/>
+          </a:p>
+        </p:txBody>
+      </p:sp>
+    </p:spTree>
+  </p:cSld>
+</p:sld>
+</file>
+
+<file path=ppt/slides/slide14.xml><?xml version="1.0" encoding="utf-8"?>
+<p:sld xmlns:a="http://schemas.openxmlformats.org/drawingml/2006/main" xmlns:p="http://schemas.openxmlformats.org/presentationml/2006/main" xmlns:r="http://schemas.openxmlformats.org/officeDocument/2006/relationships">
+  <p:cSld>
+    <p:spTree>
+      <p:nvGrpSpPr>
+        <p:cNvPr id="1" name=""/>
+        <p:cNvGrpSpPr/>
+        <p:nvPr/>
+      </p:nvGrpSpPr>
+      <p:grpSpPr>
+        <a:xfrm>
+          <a:off x="0" y="0"/>
+          <a:ext cx="0" cy="0"/>
+          <a:chOff x="0" y="0"/>
+          <a:chExt cx="0" cy="0"/>
+        </a:xfrm>
+      </p:grpSpPr>
+      <p:sp>
+        <p:nvSpPr>
+          <p:cNvPr id="194" name="TextShape 1"/>
+          <p:cNvSpPr txBox="1"/>
+          <p:nvPr/>
+        </p:nvSpPr>
+        <p:spPr>
+          <a:xfrm>
+            <a:off x="504000" y="301320"/>
+            <a:ext cx="9071640" cy="1262160"/>
+          </a:xfrm>
+          <a:prstGeom prst="rect">
+            <a:avLst/>
+          </a:prstGeom>
+        </p:spPr>
+        <p:txBody>
+          <a:bodyPr anchor="ctr" bIns="0" lIns="0" rIns="0" tIns="0" wrap="none"/>
+          <a:p>
+            <a:pPr algn="ctr"/>
+            <a:r>
+              <a:rPr lang="en-US"/>
+              <a:t>Limitations</a:t>
+            </a:r>
+            <a:endParaRPr/>
+          </a:p>
+        </p:txBody>
+      </p:sp>
+      <p:sp>
+        <p:nvSpPr>
+          <p:cNvPr id="195" name="TextShape 2"/>
+          <p:cNvSpPr txBox="1"/>
+          <p:nvPr/>
+        </p:nvSpPr>
+        <p:spPr>
+          <a:xfrm>
+            <a:off x="504000" y="1769040"/>
+            <a:ext cx="9071640" cy="4384800"/>
+          </a:xfrm>
+          <a:prstGeom prst="rect">
+            <a:avLst/>
+          </a:prstGeom>
+        </p:spPr>
+        <p:txBody>
+          <a:bodyPr bIns="0" lIns="0" rIns="0" tIns="0" wrap="none"/>
+          <a:p>
+            <a:pPr>
+              <a:buSzPct val="45000"/>
+              <a:buFont typeface="StarSymbol"/>
+              <a:buChar char=""/>
+            </a:pPr>
+            <a:r>
+              <a:rPr lang="en-US"/>
+              <a:t>Internal Validity:</a:t>
+            </a:r>
+            <a:endParaRPr/>
+          </a:p>
+          <a:p>
+            <a:pPr lvl="1">
+              <a:buSzPct val="75000"/>
+              <a:buFont typeface="StarSymbol"/>
+              <a:buChar char=""/>
+            </a:pPr>
+            <a:r>
+              <a:rPr lang="en-US"/>
+              <a:t>Inflating “Weeks of Churn” measure</a:t>
+            </a:r>
+            <a:endParaRPr/>
+          </a:p>
+          <a:p>
+            <a:pPr>
+              <a:buSzPct val="45000"/>
+              <a:buFont typeface="StarSymbol"/>
+              <a:buChar char=""/>
+            </a:pPr>
+            <a:r>
+              <a:rPr lang="en-US"/>
+              <a:t>External Validity:</a:t>
+            </a:r>
+            <a:endParaRPr/>
+          </a:p>
+          <a:p>
+            <a:pPr lvl="1">
+              <a:buSzPct val="75000"/>
+              <a:buFont typeface="StarSymbol"/>
+              <a:buChar char=""/>
+            </a:pPr>
+            <a:r>
+              <a:rPr lang="en-US"/>
+              <a:t>Different sized softwares may be incomparable</a:t>
+            </a:r>
+            <a:endParaRPr/>
+          </a:p>
+        </p:txBody>
+      </p:sp>
+      <p:sp>
+        <p:nvSpPr>
+          <p:cNvPr id="196" name="TextShape 3"/>
+          <p:cNvSpPr txBox="1"/>
+          <p:nvPr/>
+        </p:nvSpPr>
+        <p:spPr>
+          <a:xfrm>
+            <a:off x="2586960" y="7096680"/>
+            <a:ext cx="5074200" cy="354600"/>
+          </a:xfrm>
+          <a:prstGeom prst="rect">
+            <a:avLst/>
+          </a:prstGeom>
+        </p:spPr>
+        <p:txBody>
+          <a:bodyPr bIns="45000" lIns="90000" rIns="90000" tIns="45000" wrap="none"/>
+          <a:p>
+            <a:r>
+              <a:rPr lang="en-US" sz="1400">
+                <a:solidFill>
+                  <a:srgbClr val="e6e6e6"/>
+                </a:solidFill>
+              </a:rPr>
+              <a:t>Source of reference http://dl.acm.org/citation.cfm?id=1062514</a:t>
+            </a:r>
+            <a:endParaRPr/>
+          </a:p>
+        </p:txBody>
+      </p:sp>
+    </p:spTree>
+  </p:cSld>
+  <p:timing>
+    <p:tnLst>
+      <p:par>
+        <p:cTn dur="indefinite" id="74" nodeType="tmRoot" restart="never">
+          <p:childTnLst>
+            <p:seq>
+              <p:cTn id="75" nodeType="mainSeq">
+                <p:childTnLst/>
+              </p:cTn>
+              <p:prevCondLst>
+                <p:cond delay="0" evt="onPrev">
+                  <p:tgtEl>
+                    <p:sldTgt/>
+                  </p:tgtEl>
+                </p:cond>
+              </p:prevCondLst>
+              <p:nextCondLst>
+                <p:cond delay="0" evt="onNext">
+                  <p:tgtEl>
+                    <p:sldTgt/>
+                  </p:tgtEl>
+                </p:cond>
+              </p:nextCondLst>
+            </p:seq>
+          </p:childTnLst>
+        </p:cTn>
+      </p:par>
+    </p:tnLst>
+  </p:timing>
+</p:sld>
+</file>
+
+<file path=ppt/slides/slide15.xml><?xml version="1.0" encoding="utf-8"?>
+<p:sld xmlns:a="http://schemas.openxmlformats.org/drawingml/2006/main" xmlns:p="http://schemas.openxmlformats.org/presentationml/2006/main" xmlns:r="http://schemas.openxmlformats.org/officeDocument/2006/relationships">
+  <p:cSld>
+    <p:spTree>
+      <p:nvGrpSpPr>
+        <p:cNvPr id="1" name=""/>
+        <p:cNvGrpSpPr/>
+        <p:nvPr/>
+      </p:nvGrpSpPr>
+      <p:grpSpPr>
+        <a:xfrm>
+          <a:off x="0" y="0"/>
+          <a:ext cx="0" cy="0"/>
+          <a:chOff x="0" y="0"/>
+          <a:chExt cx="0" cy="0"/>
+        </a:xfrm>
+      </p:grpSpPr>
+      <p:sp>
+        <p:nvSpPr>
+          <p:cNvPr id="197" name="TextShape 1"/>
+          <p:cNvSpPr txBox="1"/>
+          <p:nvPr/>
+        </p:nvSpPr>
+        <p:spPr>
+          <a:xfrm>
+            <a:off x="504000" y="301320"/>
+            <a:ext cx="9071640" cy="1262160"/>
+          </a:xfrm>
+          <a:prstGeom prst="rect">
+            <a:avLst/>
+          </a:prstGeom>
+        </p:spPr>
+        <p:txBody>
+          <a:bodyPr anchor="ctr" bIns="0" lIns="0" rIns="0" tIns="0" wrap="none"/>
+          <a:p>
+            <a:pPr algn="ctr"/>
+            <a:r>
+              <a:rPr lang="en-US"/>
+              <a:t>Criticism</a:t>
+            </a:r>
+            <a:endParaRPr/>
+          </a:p>
+        </p:txBody>
+      </p:sp>
+      <p:sp>
+        <p:nvSpPr>
+          <p:cNvPr id="198" name="TextShape 2"/>
+          <p:cNvSpPr txBox="1"/>
+          <p:nvPr/>
+        </p:nvSpPr>
+        <p:spPr>
+          <a:xfrm>
+            <a:off x="504000" y="1769040"/>
+            <a:ext cx="9071640" cy="3168720"/>
+          </a:xfrm>
+          <a:prstGeom prst="rect">
+            <a:avLst/>
+          </a:prstGeom>
+        </p:spPr>
+        <p:txBody>
+          <a:bodyPr bIns="0" lIns="0" rIns="0" tIns="0" wrap="none"/>
+          <a:p>
+            <a:pPr>
+              <a:buSzPct val="45000"/>
+              <a:buFont typeface="StarSymbol"/>
+              <a:buChar char=""/>
+            </a:pPr>
+            <a:r>
+              <a:rPr lang="en-US"/>
+              <a:t>New developers working creates potential bugs inside the code but not as a detected bug.</a:t>
+            </a:r>
+            <a:endParaRPr/>
+          </a:p>
+          <a:p>
+            <a:pPr>
+              <a:buSzPct val="45000"/>
+              <a:buFont typeface="StarSymbol"/>
+              <a:buChar char=""/>
+            </a:pPr>
+            <a:r>
+              <a:rPr lang="en-US"/>
+              <a:t>Newer developer's codes (in-house or OSS) need to be reviewed.</a:t>
+            </a:r>
+            <a:endParaRPr/>
+          </a:p>
+          <a:p>
+            <a:pPr>
+              <a:buSzPct val="45000"/>
+              <a:buFont typeface="StarSymbol"/>
+              <a:buChar char=""/>
+            </a:pPr>
+            <a:r>
+              <a:rPr lang="en-US"/>
+              <a:t>Churns may occur due to code-review feedbacks not only from bug-fix or new feature.</a:t>
+            </a:r>
+            <a:endParaRPr/>
+          </a:p>
+        </p:txBody>
+      </p:sp>
+      <p:pic>
+        <p:nvPicPr>
+          <p:cNvPr descr="" id="199" name=""/>
+          <p:cNvPicPr/>
+          <p:nvPr/>
+        </p:nvPicPr>
+        <p:blipFill>
+          <a:blip r:embed="rId1"/>
+          <a:stretch>
+            <a:fillRect/>
+          </a:stretch>
+        </p:blipFill>
+        <p:spPr>
+          <a:xfrm>
+            <a:off x="7370640" y="4928760"/>
+            <a:ext cx="2395080" cy="2242440"/>
+          </a:xfrm>
+          <a:prstGeom prst="rect">
+            <a:avLst/>
+          </a:prstGeom>
+        </p:spPr>
+      </p:pic>
+      <p:sp>
+        <p:nvSpPr>
+          <p:cNvPr id="200" name="TextShape 3"/>
+          <p:cNvSpPr txBox="1"/>
+          <p:nvPr/>
+        </p:nvSpPr>
+        <p:spPr>
+          <a:xfrm>
+            <a:off x="2586960" y="7096680"/>
+            <a:ext cx="5074200" cy="354600"/>
+          </a:xfrm>
+          <a:prstGeom prst="rect">
+            <a:avLst/>
+          </a:prstGeom>
+        </p:spPr>
+        <p:txBody>
+          <a:bodyPr bIns="45000" lIns="90000" rIns="90000" tIns="45000" wrap="none"/>
+          <a:p>
+            <a:r>
+              <a:rPr lang="en-US" sz="1400">
+                <a:solidFill>
+                  <a:srgbClr val="e6e6e6"/>
+                </a:solidFill>
+              </a:rPr>
+              <a:t>Source of reference http://dl.acm.org/citation.cfm?id=1062514</a:t>
+            </a:r>
+            <a:endParaRPr/>
+          </a:p>
+        </p:txBody>
+      </p:sp>
+    </p:spTree>
+  </p:cSld>
+  <p:timing>
+    <p:tnLst>
+      <p:par>
+        <p:cTn dur="indefinite" id="76" nodeType="tmRoot" restart="never">
+          <p:childTnLst>
+            <p:seq>
+              <p:cTn id="77" nodeType="mainSeq">
+                <p:childTnLst/>
+              </p:cTn>
+              <p:prevCondLst>
+                <p:cond delay="0" evt="onPrev">
+                  <p:tgtEl>
+                    <p:sldTgt/>
+                  </p:tgtEl>
+                </p:cond>
+              </p:prevCondLst>
+              <p:nextCondLst>
+                <p:cond delay="0" evt="onNext">
+                  <p:tgtEl>
+                    <p:sldTgt/>
+                  </p:tgtEl>
+                </p:cond>
+              </p:nextCondLst>
+            </p:seq>
+          </p:childTnLst>
+        </p:cTn>
+      </p:par>
+    </p:tnLst>
+  </p:timing>
+</p:sld>
+</file>
+
+<file path=ppt/slides/slide16.xml><?xml version="1.0" encoding="utf-8"?>
+<p:sld xmlns:a="http://schemas.openxmlformats.org/drawingml/2006/main" xmlns:p="http://schemas.openxmlformats.org/presentationml/2006/main" xmlns:r="http://schemas.openxmlformats.org/officeDocument/2006/relationships">
+  <p:cSld>
+    <p:spTree>
+      <p:nvGrpSpPr>
+        <p:cNvPr id="1" name=""/>
+        <p:cNvGrpSpPr/>
+        <p:nvPr/>
+      </p:nvGrpSpPr>
+      <p:grpSpPr>
+        <a:xfrm>
+          <a:off x="0" y="0"/>
+          <a:ext cx="0" cy="0"/>
+          <a:chOff x="0" y="0"/>
+          <a:chExt cx="0" cy="0"/>
+        </a:xfrm>
+      </p:grpSpPr>
+      <p:sp>
+        <p:nvSpPr>
+          <p:cNvPr id="201" name="TextShape 1"/>
+          <p:cNvSpPr txBox="1"/>
+          <p:nvPr/>
+        </p:nvSpPr>
+        <p:spPr>
+          <a:xfrm>
+            <a:off x="504000" y="301320"/>
+            <a:ext cx="9071640" cy="1262160"/>
+          </a:xfrm>
+          <a:prstGeom prst="rect">
+            <a:avLst/>
+          </a:prstGeom>
+        </p:spPr>
+        <p:txBody>
+          <a:bodyPr anchor="ctr" bIns="0" lIns="0" rIns="0" tIns="0" wrap="none"/>
+          <a:p>
+            <a:pPr algn="ctr"/>
+            <a:r>
+              <a:rPr lang="en-US"/>
+              <a:t>Conclusion</a:t>
+            </a:r>
+            <a:endParaRPr/>
+          </a:p>
+        </p:txBody>
+      </p:sp>
+      <p:sp>
+        <p:nvSpPr>
+          <p:cNvPr id="202" name="TextShape 2"/>
+          <p:cNvSpPr txBox="1"/>
+          <p:nvPr/>
+        </p:nvSpPr>
+        <p:spPr>
+          <a:xfrm>
+            <a:off x="504000" y="1769040"/>
+            <a:ext cx="9071640" cy="4384800"/>
+          </a:xfrm>
+          <a:prstGeom prst="rect">
+            <a:avLst/>
+          </a:prstGeom>
+        </p:spPr>
+        <p:txBody>
+          <a:bodyPr bIns="0" lIns="0" rIns="0" tIns="0" wrap="none"/>
+          <a:p>
+            <a:pPr>
+              <a:buSzPct val="45000"/>
+              <a:buFont typeface="StarSymbol"/>
+              <a:buChar char=""/>
+            </a:pPr>
+            <a:r>
+              <a:rPr lang="en-US"/>
+              <a:t>Relative code-churn measures are better predictor</a:t>
+            </a:r>
+            <a:endParaRPr/>
+          </a:p>
+          <a:p>
+            <a:pPr>
+              <a:buSzPct val="45000"/>
+              <a:buFont typeface="StarSymbol"/>
+              <a:buChar char=""/>
+            </a:pPr>
+            <a:r>
+              <a:rPr lang="en-US"/>
+              <a:t>Increase in this measure is accompained by an increase in system defect density.</a:t>
+            </a:r>
+            <a:endParaRPr/>
+          </a:p>
+        </p:txBody>
+      </p:sp>
+      <p:pic>
+        <p:nvPicPr>
+          <p:cNvPr descr="" id="203" name=""/>
+          <p:cNvPicPr/>
+          <p:nvPr/>
+        </p:nvPicPr>
+        <p:blipFill>
+          <a:blip r:embed="rId1"/>
+          <a:stretch>
+            <a:fillRect/>
+          </a:stretch>
+        </p:blipFill>
+        <p:spPr>
+          <a:xfrm>
+            <a:off x="6675120" y="4266720"/>
+            <a:ext cx="3055320" cy="2594160"/>
+          </a:xfrm>
+          <a:prstGeom prst="rect">
+            <a:avLst/>
+          </a:prstGeom>
+        </p:spPr>
+      </p:pic>
+      <p:sp>
+        <p:nvSpPr>
+          <p:cNvPr id="204" name="TextShape 3"/>
+          <p:cNvSpPr txBox="1"/>
+          <p:nvPr/>
+        </p:nvSpPr>
+        <p:spPr>
+          <a:xfrm>
+            <a:off x="2586960" y="7096680"/>
+            <a:ext cx="5074200" cy="354600"/>
+          </a:xfrm>
+          <a:prstGeom prst="rect">
+            <a:avLst/>
+          </a:prstGeom>
+        </p:spPr>
+        <p:txBody>
+          <a:bodyPr bIns="45000" lIns="90000" rIns="90000" tIns="45000" wrap="none"/>
+          <a:p>
+            <a:r>
+              <a:rPr lang="en-US" sz="1400">
+                <a:solidFill>
+                  <a:srgbClr val="e6e6e6"/>
+                </a:solidFill>
+              </a:rPr>
+              <a:t>Source of reference http://dl.acm.org/citation.cfm?id=1062514</a:t>
+            </a:r>
+            <a:endParaRPr/>
+          </a:p>
+        </p:txBody>
+      </p:sp>
+    </p:spTree>
+  </p:cSld>
+</p:sld>
+</file>
+
+<file path=ppt/slides/slide2.xml><?xml version="1.0" encoding="utf-8"?>
+<p:sld xmlns:a="http://schemas.openxmlformats.org/drawingml/2006/main" xmlns:p="http://schemas.openxmlformats.org/presentationml/2006/main" xmlns:r="http://schemas.openxmlformats.org/officeDocument/2006/relationships">
+  <p:cSld>
+    <p:spTree>
+      <p:nvGrpSpPr>
+        <p:cNvPr id="1" name=""/>
+        <p:cNvGrpSpPr/>
+        <p:nvPr/>
+      </p:nvGrpSpPr>
+      <p:grpSpPr>
+        <a:xfrm>
+          <a:off x="0" y="0"/>
+          <a:ext cx="0" cy="0"/>
+          <a:chOff x="0" y="0"/>
+          <a:chExt cx="0" cy="0"/>
+        </a:xfrm>
+      </p:grpSpPr>
+      <p:sp>
+        <p:nvSpPr>
+          <p:cNvPr id="114" name="TextShape 1"/>
+          <p:cNvSpPr txBox="1"/>
+          <p:nvPr/>
+        </p:nvSpPr>
+        <p:spPr>
+          <a:xfrm>
+            <a:off x="504000" y="301320"/>
+            <a:ext cx="9071640" cy="1262160"/>
+          </a:xfrm>
+          <a:prstGeom prst="rect">
+            <a:avLst/>
+          </a:prstGeom>
+        </p:spPr>
+        <p:txBody>
+          <a:bodyPr anchor="ctr" bIns="0" lIns="0" rIns="0" tIns="0" wrap="none"/>
+          <a:p>
+            <a:pPr algn="ctr"/>
+            <a:r>
+              <a:rPr lang="en-US"/>
+              <a:t>Overall Idea</a:t>
+            </a:r>
+            <a:endParaRPr/>
+          </a:p>
+        </p:txBody>
+      </p:sp>
+      <p:sp>
+        <p:nvSpPr>
+          <p:cNvPr id="115" name="TextShape 2"/>
+          <p:cNvSpPr txBox="1"/>
+          <p:nvPr/>
+        </p:nvSpPr>
+        <p:spPr>
+          <a:xfrm>
+            <a:off x="504000" y="1769040"/>
+            <a:ext cx="8870040" cy="4294440"/>
+          </a:xfrm>
+          <a:prstGeom prst="rect">
+            <a:avLst/>
+          </a:prstGeom>
+        </p:spPr>
+        <p:txBody>
+          <a:bodyPr bIns="0" lIns="0" rIns="0" tIns="0" wrap="none"/>
+          <a:p>
+            <a:pPr>
+              <a:buSzPct val="45000"/>
+              <a:buFont typeface="StarSymbol"/>
+              <a:buChar char=""/>
+            </a:pPr>
+            <a:r>
+              <a:rPr lang="en-US" sz="2800"/>
+              <a:t>Early prediction of System Defect Density</a:t>
+            </a:r>
+            <a:endParaRPr/>
+          </a:p>
+          <a:p>
+            <a:pPr>
+              <a:buSzPct val="45000"/>
+              <a:buFont typeface="StarSymbol"/>
+              <a:buChar char=""/>
+            </a:pPr>
+            <a:r>
+              <a:rPr lang="en-US" sz="2800"/>
+              <a:t>Using set of relative code churn measures</a:t>
+            </a:r>
+            <a:endParaRPr/>
+          </a:p>
+          <a:p>
+            <a:pPr>
+              <a:buSzPct val="45000"/>
+              <a:buFont typeface="StarSymbol"/>
+              <a:buChar char=""/>
+            </a:pPr>
+            <a:r>
+              <a:rPr lang="en-US" sz="2800"/>
+              <a:t>Showing that this measure is more predictive than A</a:t>
+            </a:r>
+            <a:r>
+              <a:rPr b="1" lang="en-US" sz="2800"/>
+              <a:t>bsolute Measures</a:t>
+            </a:r>
+            <a:r>
+              <a:rPr lang="en-US" sz="2800"/>
+              <a:t> of code churn</a:t>
+            </a:r>
+            <a:endParaRPr/>
+          </a:p>
+          <a:p>
+            <a:pPr>
+              <a:buSzPct val="45000"/>
+              <a:buFont typeface="StarSymbol"/>
+              <a:buChar char=""/>
+            </a:pPr>
+            <a:r>
+              <a:rPr lang="en-US" sz="2800"/>
+              <a:t>Case study on Windows Server 2003 for validity.</a:t>
+            </a:r>
+            <a:endParaRPr/>
+          </a:p>
+          <a:p>
+            <a:pPr>
+              <a:buSzPct val="45000"/>
+              <a:buFont typeface="StarSymbol"/>
+              <a:buChar char=""/>
+            </a:pPr>
+            <a:endParaRPr/>
+          </a:p>
+          <a:p>
+            <a:pPr>
+              <a:buSzPct val="45000"/>
+              <a:buFont typeface="StarSymbol"/>
+              <a:buChar char=""/>
+            </a:pPr>
+            <a:r>
+              <a:rPr lang="en-US" sz="2800"/>
+              <a:t>Accuracy is </a:t>
+            </a:r>
+            <a:r>
+              <a:rPr b="1" lang="en-US" sz="2800"/>
+              <a:t>89.0</a:t>
+            </a:r>
+            <a:r>
+              <a:rPr lang="en-US" sz="2800"/>
+              <a:t>%</a:t>
+            </a:r>
+            <a:endParaRPr/>
+          </a:p>
+        </p:txBody>
+      </p:sp>
+      <p:pic>
+        <p:nvPicPr>
+          <p:cNvPr descr="" id="116" name=""/>
+          <p:cNvPicPr/>
+          <p:nvPr/>
+        </p:nvPicPr>
+        <p:blipFill>
+          <a:blip r:embed="rId1"/>
+          <a:stretch>
+            <a:fillRect/>
+          </a:stretch>
+        </p:blipFill>
+        <p:spPr>
+          <a:xfrm>
+            <a:off x="6652800" y="4408560"/>
+            <a:ext cx="2936880" cy="2020320"/>
+          </a:xfrm>
+          <a:prstGeom prst="rect">
+            <a:avLst/>
+          </a:prstGeom>
+        </p:spPr>
+      </p:pic>
+      <p:sp>
+        <p:nvSpPr>
+          <p:cNvPr id="117" name="TextShape 3"/>
+          <p:cNvSpPr txBox="1"/>
+          <p:nvPr/>
+        </p:nvSpPr>
+        <p:spPr>
+          <a:xfrm>
+            <a:off x="2586960" y="7096680"/>
+            <a:ext cx="5074200" cy="354600"/>
+          </a:xfrm>
+          <a:prstGeom prst="rect">
+            <a:avLst/>
+          </a:prstGeom>
+        </p:spPr>
+        <p:txBody>
+          <a:bodyPr bIns="45000" lIns="90000" rIns="90000" tIns="45000" wrap="none"/>
+          <a:p>
+            <a:r>
+              <a:rPr lang="en-US" sz="1400">
+                <a:solidFill>
+                  <a:srgbClr val="e6e6e6"/>
+                </a:solidFill>
+              </a:rPr>
+              <a:t>Source of reference http://dl.acm.org/citation.cfm?id=1062514</a:t>
+            </a:r>
+            <a:endParaRPr/>
+          </a:p>
+        </p:txBody>
+      </p:sp>
+    </p:spTree>
+  </p:cSld>
+</p:sld>
+</file>
+
 <file path=ppt/slides/slide3.xml><?xml version="1.0" encoding="utf-8"?>
 <p:sld xmlns:a="http://schemas.openxmlformats.org/drawingml/2006/main" xmlns:p="http://schemas.openxmlformats.org/presentationml/2006/main" xmlns:r="http://schemas.openxmlformats.org/officeDocument/2006/relationships">
   <p:cSld>
@@ -6699,7 +6892,7 @@
         </p:nvGraphicFramePr>
         <p:xfrm>
           <a:off x="768960" y="3250080"/>
-          <a:ext cx="8466480" cy="3016440"/>
+          <a:ext cx="8466120" cy="3016440"/>
         </p:xfrm>
         <a:graphic>
           <a:graphicData uri="http://schemas.openxmlformats.org/drawingml/2006/table">
@@ -6955,35 +7148,6 @@
       </p:sp>
     </p:spTree>
   </p:cSld>
-  <p:timing>
-    <p:tnLst>
-      <p:par>
-        <p:cTn dur="indefinite" id="3" nodeType="tmRoot" restart="never">
-          <p:childTnLst>
-            <p:seq>
-              <p:cTn id="4" nodeType="mainSeq">
-                <p:childTnLst/>
-              </p:cTn>
-              <p:prevCondLst>
-                <p:cond delay="0" evt="onPrev">
-                  <p:tgtEl>
-                    <p:sldTgt/>
-                  </p:tgtEl>
-                </p:cond>
-              </p:prevCondLst>
-              <p:nextCondLst>
-                <p:cond delay="0" evt="onNext">
-                  <p:tgtEl>
-                    <p:sldTgt/>
-                  </p:tgtEl>
-                </p:cond>
-              </p:nextCondLst>
-            </p:seq>
-          </p:childTnLst>
-        </p:cTn>
-      </p:par>
-    </p:tnLst>
-  </p:timing>
 </p:sld>
 </file>
 
@@ -7389,7 +7553,7 @@
         </p:nvSpPr>
         <p:spPr>
           <a:xfrm>
-            <a:off x="504000" y="1769040"/>
+            <a:off x="505080" y="1786680"/>
             <a:ext cx="9071640" cy="4431240"/>
           </a:xfrm>
           <a:prstGeom prst="rect">
@@ -7405,8 +7569,16 @@
               <a:buChar char=""/>
             </a:pPr>
             <a:r>
+              <a:rPr lang="en-US" sz="2800">
+                <a:solidFill>
+                  <a:srgbClr val="ffff00"/>
+                </a:solidFill>
+              </a:rPr>
+              <a:t>M1</a:t>
+            </a:r>
+            <a:r>
               <a:rPr lang="en-US" sz="2800"/>
-              <a:t>M1: Churned LOC / Total LOC</a:t>
+              <a:t>: Churned LOC / Total LOC</a:t>
             </a:r>
             <a:endParaRPr/>
           </a:p>
@@ -7417,8 +7589,16 @@
               <a:buChar char=""/>
             </a:pPr>
             <a:r>
+              <a:rPr lang="en-US" sz="2800">
+                <a:solidFill>
+                  <a:srgbClr val="ffff00"/>
+                </a:solidFill>
+              </a:rPr>
+              <a:t>M2</a:t>
+            </a:r>
+            <a:r>
               <a:rPr lang="en-US" sz="2800"/>
-              <a:t>M2: Deleted LOC / Total LOC</a:t>
+              <a:t>: Deleted LOC / Total LOC</a:t>
             </a:r>
             <a:endParaRPr/>
           </a:p>
@@ -7429,8 +7609,16 @@
               <a:buChar char=""/>
             </a:pPr>
             <a:r>
+              <a:rPr lang="en-US" sz="2800">
+                <a:solidFill>
+                  <a:srgbClr val="ffff00"/>
+                </a:solidFill>
+              </a:rPr>
+              <a:t>M3</a:t>
+            </a:r>
+            <a:r>
               <a:rPr lang="en-US" sz="2800"/>
-              <a:t>M3: Files Churned / File Count</a:t>
+              <a:t>: Files Churned / File Count</a:t>
             </a:r>
             <a:endParaRPr/>
           </a:p>
@@ -7441,8 +7629,16 @@
               <a:buChar char=""/>
             </a:pPr>
             <a:r>
+              <a:rPr lang="en-US" sz="2800">
+                <a:solidFill>
+                  <a:srgbClr val="ffff00"/>
+                </a:solidFill>
+              </a:rPr>
+              <a:t>M4</a:t>
+            </a:r>
+            <a:r>
               <a:rPr lang="en-US" sz="2800"/>
-              <a:t>M4: Churn Count / File Churned</a:t>
+              <a:t>: Churn Count / File Churned</a:t>
             </a:r>
             <a:endParaRPr/>
           </a:p>
@@ -7453,8 +7649,24 @@
               <a:buChar char=""/>
             </a:pPr>
             <a:r>
+              <a:rPr lang="en-US" sz="2800">
+                <a:solidFill>
+                  <a:srgbClr val="ffff00"/>
+                </a:solidFill>
+              </a:rPr>
+              <a:t>M5</a:t>
+            </a:r>
+            <a:r>
               <a:rPr lang="en-US" sz="2800"/>
-              <a:t>M5: Weeks of Churn / File Count</a:t>
+              <a:t>: Weeks of Churn / File Count </a:t>
+            </a:r>
+            <a:r>
+              <a:rPr i="1" lang="en-US" sz="2000">
+                <a:solidFill>
+                  <a:srgbClr val="b3b3b3"/>
+                </a:solidFill>
+              </a:rPr>
+              <a:t>(gives sense of complexity)</a:t>
             </a:r>
             <a:endParaRPr/>
           </a:p>
@@ -7465,8 +7677,24 @@
               <a:buChar char=""/>
             </a:pPr>
             <a:r>
+              <a:rPr lang="en-US" sz="2800">
+                <a:solidFill>
+                  <a:srgbClr val="ffff00"/>
+                </a:solidFill>
+              </a:rPr>
+              <a:t>M6</a:t>
+            </a:r>
+            <a:r>
               <a:rPr lang="en-US" sz="2800"/>
-              <a:t>M6: Lines Worked On / Weeks of Churn</a:t>
+              <a:t>: Lines Worked On / Weeks of Churn </a:t>
+            </a:r>
+            <a:r>
+              <a:rPr i="1" lang="en-US" sz="2000">
+                <a:solidFill>
+                  <a:srgbClr val="b3b3b3"/>
+                </a:solidFill>
+              </a:rPr>
+              <a:t>(sum of M1,M2)</a:t>
             </a:r>
             <a:endParaRPr/>
           </a:p>
@@ -7477,8 +7705,16 @@
               <a:buChar char=""/>
             </a:pPr>
             <a:r>
+              <a:rPr lang="en-US" sz="2800">
+                <a:solidFill>
+                  <a:srgbClr val="ffff00"/>
+                </a:solidFill>
+              </a:rPr>
+              <a:t>M7</a:t>
+            </a:r>
+            <a:r>
               <a:rPr lang="en-US" sz="2800"/>
-              <a:t>M7: Churned LOC / Deleted LOC</a:t>
+              <a:t>: Churned LOC / Deleted LOC</a:t>
             </a:r>
             <a:endParaRPr/>
           </a:p>
@@ -7489,8 +7725,16 @@
               <a:buChar char=""/>
             </a:pPr>
             <a:r>
+              <a:rPr lang="en-US" sz="2800">
+                <a:solidFill>
+                  <a:srgbClr val="ffff00"/>
+                </a:solidFill>
+              </a:rPr>
+              <a:t>M8</a:t>
+            </a:r>
+            <a:r>
               <a:rPr lang="en-US" sz="2800"/>
-              <a:t>M8: Lines Worked On / Churn Count</a:t>
+              <a:t>: Lines Worked On / Churn Count</a:t>
             </a:r>
             <a:endParaRPr/>
           </a:p>
@@ -7531,32 +7775,32 @@
   <p:timing>
     <p:tnLst>
       <p:par>
-        <p:cTn dur="indefinite" id="5" nodeType="tmRoot" restart="never">
+        <p:cTn dur="indefinite" id="1" nodeType="tmRoot" restart="never">
           <p:childTnLst>
             <p:seq>
-              <p:cTn id="6" nodeType="mainSeq">
+              <p:cTn id="2" nodeType="mainSeq">
                 <p:childTnLst>
                   <p:par>
-                    <p:cTn fill="freeze" id="7">
+                    <p:cTn fill="freeze" id="3">
                       <p:stCondLst>
                         <p:cond delay="indefinite"/>
                       </p:stCondLst>
                       <p:childTnLst>
                         <p:par>
-                          <p:cTn fill="freeze" id="8">
+                          <p:cTn fill="freeze" id="4">
                             <p:stCondLst>
                               <p:cond delay="0"/>
                             </p:stCondLst>
                             <p:childTnLst>
                               <p:par>
-                                <p:cTn fill="hold" id="9" nodeType="clickEffect" presetClass="entr" presetID="2" presetSubtype="4">
+                                <p:cTn fill="hold" id="5" nodeType="clickEffect" presetClass="entr" presetID="2" presetSubtype="4">
                                   <p:stCondLst>
                                     <p:cond delay="0"/>
                                   </p:stCondLst>
                                   <p:childTnLst>
                                     <p:set>
                                       <p:cBhvr>
-                                        <p:cTn dur="1" fill="hold" id="10">
+                                        <p:cTn dur="1" fill="hold" id="6">
                                           <p:stCondLst>
                                             <p:cond delay="0"/>
                                           </p:stCondLst>
@@ -7578,7 +7822,7 @@
                                     </p:set>
                                     <p:anim calcmode="lin" valueType="num">
                                       <p:cBhvr additive="repl">
-                                        <p:cTn dur="500" fill="hold" id="11"/>
+                                        <p:cTn dur="500" fill="hold" id="7"/>
                                         <p:tgtEl>
                                           <p:spTgt spid="130">
                                             <p:txEl>
@@ -7605,7 +7849,7 @@
                                     </p:anim>
                                     <p:anim calcmode="lin" valueType="num">
                                       <p:cBhvr additive="repl">
-                                        <p:cTn dur="500" fill="hold" id="12"/>
+                                        <p:cTn dur="500" fill="hold" id="8"/>
                                         <p:tgtEl>
                                           <p:spTgt spid="130">
                                             <p:txEl>
@@ -7640,26 +7884,26 @@
                     </p:cTn>
                   </p:par>
                   <p:par>
-                    <p:cTn fill="freeze" id="13">
+                    <p:cTn fill="freeze" id="9">
                       <p:stCondLst>
                         <p:cond delay="indefinite"/>
                       </p:stCondLst>
                       <p:childTnLst>
                         <p:par>
-                          <p:cTn fill="freeze" id="14">
+                          <p:cTn fill="freeze" id="10">
                             <p:stCondLst>
                               <p:cond delay="0"/>
                             </p:stCondLst>
                             <p:childTnLst>
                               <p:par>
-                                <p:cTn fill="hold" id="15" nodeType="clickEffect" presetClass="entr" presetID="2" presetSubtype="4">
+                                <p:cTn fill="hold" id="11" nodeType="clickEffect" presetClass="entr" presetID="2" presetSubtype="4">
                                   <p:stCondLst>
                                     <p:cond delay="0"/>
                                   </p:stCondLst>
                                   <p:childTnLst>
                                     <p:set>
                                       <p:cBhvr>
-                                        <p:cTn dur="1" fill="hold" id="16">
+                                        <p:cTn dur="1" fill="hold" id="12">
                                           <p:stCondLst>
                                             <p:cond delay="0"/>
                                           </p:stCondLst>
@@ -7681,7 +7925,7 @@
                                     </p:set>
                                     <p:anim calcmode="lin" valueType="num">
                                       <p:cBhvr additive="repl">
-                                        <p:cTn dur="500" fill="hold" id="17"/>
+                                        <p:cTn dur="500" fill="hold" id="13"/>
                                         <p:tgtEl>
                                           <p:spTgt spid="130">
                                             <p:txEl>
@@ -7708,7 +7952,7 @@
                                     </p:anim>
                                     <p:anim calcmode="lin" valueType="num">
                                       <p:cBhvr additive="repl">
-                                        <p:cTn dur="500" fill="hold" id="18"/>
+                                        <p:cTn dur="500" fill="hold" id="14"/>
                                         <p:tgtEl>
                                           <p:spTgt spid="130">
                                             <p:txEl>
@@ -7743,26 +7987,26 @@
                     </p:cTn>
                   </p:par>
                   <p:par>
-                    <p:cTn fill="freeze" id="19">
+                    <p:cTn fill="freeze" id="15">
                       <p:stCondLst>
                         <p:cond delay="indefinite"/>
                       </p:stCondLst>
                       <p:childTnLst>
                         <p:par>
-                          <p:cTn fill="freeze" id="20">
+                          <p:cTn fill="freeze" id="16">
                             <p:stCondLst>
                               <p:cond delay="0"/>
                             </p:stCondLst>
                             <p:childTnLst>
                               <p:par>
-                                <p:cTn fill="hold" id="21" nodeType="clickEffect" presetClass="entr" presetID="2" presetSubtype="4">
+                                <p:cTn fill="hold" id="17" nodeType="clickEffect" presetClass="entr" presetID="2" presetSubtype="4">
                                   <p:stCondLst>
                                     <p:cond delay="0"/>
                                   </p:stCondLst>
                                   <p:childTnLst>
                                     <p:set>
                                       <p:cBhvr>
-                                        <p:cTn dur="1" fill="hold" id="22">
+                                        <p:cTn dur="1" fill="hold" id="18">
                                           <p:stCondLst>
                                             <p:cond delay="0"/>
                                           </p:stCondLst>
@@ -7784,7 +8028,7 @@
                                     </p:set>
                                     <p:anim calcmode="lin" valueType="num">
                                       <p:cBhvr additive="repl">
-                                        <p:cTn dur="500" fill="hold" id="23"/>
+                                        <p:cTn dur="500" fill="hold" id="19"/>
                                         <p:tgtEl>
                                           <p:spTgt spid="130">
                                             <p:txEl>
@@ -7811,7 +8055,7 @@
                                     </p:anim>
                                     <p:anim calcmode="lin" valueType="num">
                                       <p:cBhvr additive="repl">
-                                        <p:cTn dur="500" fill="hold" id="24"/>
+                                        <p:cTn dur="500" fill="hold" id="20"/>
                                         <p:tgtEl>
                                           <p:spTgt spid="130">
                                             <p:txEl>
@@ -7846,26 +8090,26 @@
                     </p:cTn>
                   </p:par>
                   <p:par>
-                    <p:cTn fill="freeze" id="25">
+                    <p:cTn fill="freeze" id="21">
                       <p:stCondLst>
                         <p:cond delay="indefinite"/>
                       </p:stCondLst>
                       <p:childTnLst>
                         <p:par>
-                          <p:cTn fill="freeze" id="26">
+                          <p:cTn fill="freeze" id="22">
                             <p:stCondLst>
                               <p:cond delay="0"/>
                             </p:stCondLst>
                             <p:childTnLst>
                               <p:par>
-                                <p:cTn fill="hold" id="27" nodeType="clickEffect" presetClass="entr" presetID="2" presetSubtype="4">
+                                <p:cTn fill="hold" id="23" nodeType="clickEffect" presetClass="entr" presetID="2" presetSubtype="4">
                                   <p:stCondLst>
                                     <p:cond delay="0"/>
                                   </p:stCondLst>
                                   <p:childTnLst>
                                     <p:set>
                                       <p:cBhvr>
-                                        <p:cTn dur="1" fill="hold" id="28">
+                                        <p:cTn dur="1" fill="hold" id="24">
                                           <p:stCondLst>
                                             <p:cond delay="0"/>
                                           </p:stCondLst>
@@ -7887,7 +8131,7 @@
                                     </p:set>
                                     <p:anim calcmode="lin" valueType="num">
                                       <p:cBhvr additive="repl">
-                                        <p:cTn dur="500" fill="hold" id="29"/>
+                                        <p:cTn dur="500" fill="hold" id="25"/>
                                         <p:tgtEl>
                                           <p:spTgt spid="130">
                                             <p:txEl>
@@ -7914,7 +8158,7 @@
                                     </p:anim>
                                     <p:anim calcmode="lin" valueType="num">
                                       <p:cBhvr additive="repl">
-                                        <p:cTn dur="500" fill="hold" id="30"/>
+                                        <p:cTn dur="500" fill="hold" id="26"/>
                                         <p:tgtEl>
                                           <p:spTgt spid="130">
                                             <p:txEl>
@@ -7949,26 +8193,26 @@
                     </p:cTn>
                   </p:par>
                   <p:par>
-                    <p:cTn fill="freeze" id="31">
+                    <p:cTn fill="freeze" id="27">
                       <p:stCondLst>
                         <p:cond delay="indefinite"/>
                       </p:stCondLst>
                       <p:childTnLst>
                         <p:par>
-                          <p:cTn fill="freeze" id="32">
+                          <p:cTn fill="freeze" id="28">
                             <p:stCondLst>
                               <p:cond delay="0"/>
                             </p:stCondLst>
                             <p:childTnLst>
                               <p:par>
-                                <p:cTn fill="hold" id="33" nodeType="clickEffect" presetClass="entr" presetID="2" presetSubtype="4">
+                                <p:cTn fill="hold" id="29" nodeType="clickEffect" presetClass="entr" presetID="2" presetSubtype="4">
                                   <p:stCondLst>
                                     <p:cond delay="0"/>
                                   </p:stCondLst>
                                   <p:childTnLst>
                                     <p:set>
                                       <p:cBhvr>
-                                        <p:cTn dur="1" fill="hold" id="34">
+                                        <p:cTn dur="1" fill="hold" id="30">
                                           <p:stCondLst>
                                             <p:cond delay="0"/>
                                           </p:stCondLst>
@@ -7976,7 +8220,7 @@
                                         <p:tgtEl>
                                           <p:spTgt spid="130">
                                             <p:txEl>
-                                              <p:pRg end="150" st="118"/>
+                                              <p:pRg end="178" st="118"/>
                                             </p:txEl>
                                           </p:spTgt>
                                         </p:tgtEl>
@@ -7990,11 +8234,11 @@
                                     </p:set>
                                     <p:anim calcmode="lin" valueType="num">
                                       <p:cBhvr additive="repl">
-                                        <p:cTn dur="500" fill="hold" id="35"/>
+                                        <p:cTn dur="500" fill="hold" id="31"/>
                                         <p:tgtEl>
                                           <p:spTgt spid="130">
                                             <p:txEl>
-                                              <p:pRg end="150" st="118"/>
+                                              <p:pRg end="178" st="118"/>
                                             </p:txEl>
                                           </p:spTgt>
                                         </p:tgtEl>
@@ -8017,11 +8261,11 @@
                                     </p:anim>
                                     <p:anim calcmode="lin" valueType="num">
                                       <p:cBhvr additive="repl">
-                                        <p:cTn dur="500" fill="hold" id="36"/>
+                                        <p:cTn dur="500" fill="hold" id="32"/>
                                         <p:tgtEl>
                                           <p:spTgt spid="130">
                                             <p:txEl>
-                                              <p:pRg end="150" st="118"/>
+                                              <p:pRg end="178" st="118"/>
                                             </p:txEl>
                                           </p:spTgt>
                                         </p:tgtEl>
@@ -8052,26 +8296,26 @@
                     </p:cTn>
                   </p:par>
                   <p:par>
-                    <p:cTn fill="freeze" id="37">
+                    <p:cTn fill="freeze" id="33">
                       <p:stCondLst>
                         <p:cond delay="indefinite"/>
                       </p:stCondLst>
                       <p:childTnLst>
                         <p:par>
-                          <p:cTn fill="freeze" id="38">
+                          <p:cTn fill="freeze" id="34">
                             <p:stCondLst>
                               <p:cond delay="0"/>
                             </p:stCondLst>
                             <p:childTnLst>
                               <p:par>
-                                <p:cTn fill="hold" id="39" nodeType="clickEffect" presetClass="entr" presetID="2" presetSubtype="4">
+                                <p:cTn fill="hold" id="35" nodeType="clickEffect" presetClass="entr" presetID="2" presetSubtype="4">
                                   <p:stCondLst>
                                     <p:cond delay="0"/>
                                   </p:stCondLst>
                                   <p:childTnLst>
                                     <p:set>
                                       <p:cBhvr>
-                                        <p:cTn dur="1" fill="hold" id="40">
+                                        <p:cTn dur="1" fill="hold" id="36">
                                           <p:stCondLst>
                                             <p:cond delay="0"/>
                                           </p:stCondLst>
@@ -8079,7 +8323,7 @@
                                         <p:tgtEl>
                                           <p:spTgt spid="130">
                                             <p:txEl>
-                                              <p:pRg end="187" st="150"/>
+                                              <p:pRg end="230" st="178"/>
                                             </p:txEl>
                                           </p:spTgt>
                                         </p:tgtEl>
@@ -8093,11 +8337,11 @@
                                     </p:set>
                                     <p:anim calcmode="lin" valueType="num">
                                       <p:cBhvr additive="repl">
-                                        <p:cTn dur="500" fill="hold" id="41"/>
+                                        <p:cTn dur="500" fill="hold" id="37"/>
                                         <p:tgtEl>
                                           <p:spTgt spid="130">
                                             <p:txEl>
-                                              <p:pRg end="187" st="150"/>
+                                              <p:pRg end="230" st="178"/>
                                             </p:txEl>
                                           </p:spTgt>
                                         </p:tgtEl>
@@ -8120,11 +8364,11 @@
                                     </p:anim>
                                     <p:anim calcmode="lin" valueType="num">
                                       <p:cBhvr additive="repl">
-                                        <p:cTn dur="500" fill="hold" id="42"/>
+                                        <p:cTn dur="500" fill="hold" id="38"/>
                                         <p:tgtEl>
                                           <p:spTgt spid="130">
                                             <p:txEl>
-                                              <p:pRg end="187" st="150"/>
+                                              <p:pRg end="230" st="178"/>
                                             </p:txEl>
                                           </p:spTgt>
                                         </p:tgtEl>
@@ -8155,26 +8399,26 @@
                     </p:cTn>
                   </p:par>
                   <p:par>
-                    <p:cTn fill="freeze" id="43">
+                    <p:cTn fill="freeze" id="39">
                       <p:stCondLst>
                         <p:cond delay="indefinite"/>
                       </p:stCondLst>
                       <p:childTnLst>
                         <p:par>
-                          <p:cTn fill="freeze" id="44">
+                          <p:cTn fill="freeze" id="40">
                             <p:stCondLst>
                               <p:cond delay="0"/>
                             </p:stCondLst>
                             <p:childTnLst>
                               <p:par>
-                                <p:cTn fill="hold" id="45" nodeType="clickEffect" presetClass="entr" presetID="2" presetSubtype="4">
+                                <p:cTn fill="hold" id="41" nodeType="clickEffect" presetClass="entr" presetID="2" presetSubtype="4">
                                   <p:stCondLst>
                                     <p:cond delay="0"/>
                                   </p:stCondLst>
                                   <p:childTnLst>
                                     <p:set>
                                       <p:cBhvr>
-                                        <p:cTn dur="1" fill="hold" id="46">
+                                        <p:cTn dur="1" fill="hold" id="42">
                                           <p:stCondLst>
                                             <p:cond delay="0"/>
                                           </p:stCondLst>
@@ -8182,7 +8426,7 @@
                                         <p:tgtEl>
                                           <p:spTgt spid="130">
                                             <p:txEl>
-                                              <p:pRg end="217" st="187"/>
+                                              <p:pRg end="260" st="230"/>
                                             </p:txEl>
                                           </p:spTgt>
                                         </p:tgtEl>
@@ -8196,11 +8440,11 @@
                                     </p:set>
                                     <p:anim calcmode="lin" valueType="num">
                                       <p:cBhvr additive="repl">
-                                        <p:cTn dur="500" fill="hold" id="47"/>
+                                        <p:cTn dur="500" fill="hold" id="43"/>
                                         <p:tgtEl>
                                           <p:spTgt spid="130">
                                             <p:txEl>
-                                              <p:pRg end="217" st="187"/>
+                                              <p:pRg end="260" st="230"/>
                                             </p:txEl>
                                           </p:spTgt>
                                         </p:tgtEl>
@@ -8223,11 +8467,11 @@
                                     </p:anim>
                                     <p:anim calcmode="lin" valueType="num">
                                       <p:cBhvr additive="repl">
-                                        <p:cTn dur="500" fill="hold" id="48"/>
+                                        <p:cTn dur="500" fill="hold" id="44"/>
                                         <p:tgtEl>
                                           <p:spTgt spid="130">
                                             <p:txEl>
-                                              <p:pRg end="217" st="187"/>
+                                              <p:pRg end="260" st="230"/>
                                             </p:txEl>
                                           </p:spTgt>
                                         </p:tgtEl>
@@ -8258,26 +8502,26 @@
                     </p:cTn>
                   </p:par>
                   <p:par>
-                    <p:cTn fill="freeze" id="49">
+                    <p:cTn fill="freeze" id="45">
                       <p:stCondLst>
                         <p:cond delay="indefinite"/>
                       </p:stCondLst>
                       <p:childTnLst>
                         <p:par>
-                          <p:cTn fill="freeze" id="50">
+                          <p:cTn fill="freeze" id="46">
                             <p:stCondLst>
                               <p:cond delay="0"/>
                             </p:stCondLst>
                             <p:childTnLst>
                               <p:par>
-                                <p:cTn fill="hold" id="51" nodeType="clickEffect" presetClass="entr" presetID="2" presetSubtype="4">
+                                <p:cTn fill="hold" id="47" nodeType="clickEffect" presetClass="entr" presetID="2" presetSubtype="4">
                                   <p:stCondLst>
                                     <p:cond delay="0"/>
                                   </p:stCondLst>
                                   <p:childTnLst>
                                     <p:set>
                                       <p:cBhvr>
-                                        <p:cTn dur="1" fill="hold" id="52">
+                                        <p:cTn dur="1" fill="hold" id="48">
                                           <p:stCondLst>
                                             <p:cond delay="0"/>
                                           </p:stCondLst>
@@ -8285,7 +8529,7 @@
                                         <p:tgtEl>
                                           <p:spTgt spid="130">
                                             <p:txEl>
-                                              <p:pRg end="251" st="217"/>
+                                              <p:pRg end="294" st="260"/>
                                             </p:txEl>
                                           </p:spTgt>
                                         </p:tgtEl>
@@ -8299,11 +8543,11 @@
                                     </p:set>
                                     <p:anim calcmode="lin" valueType="num">
                                       <p:cBhvr additive="repl">
-                                        <p:cTn dur="500" fill="hold" id="53"/>
+                                        <p:cTn dur="500" fill="hold" id="49"/>
                                         <p:tgtEl>
                                           <p:spTgt spid="130">
                                             <p:txEl>
-                                              <p:pRg end="251" st="217"/>
+                                              <p:pRg end="294" st="260"/>
                                             </p:txEl>
                                           </p:spTgt>
                                         </p:tgtEl>
@@ -8326,11 +8570,11 @@
                                     </p:anim>
                                     <p:anim calcmode="lin" valueType="num">
                                       <p:cBhvr additive="repl">
-                                        <p:cTn dur="500" fill="hold" id="54"/>
+                                        <p:cTn dur="500" fill="hold" id="50"/>
                                         <p:tgtEl>
                                           <p:spTgt spid="130">
                                             <p:txEl>
-                                              <p:pRg end="251" st="217"/>
+                                              <p:pRg end="294" st="260"/>
                                             </p:txEl>
                                           </p:spTgt>
                                         </p:tgtEl>
@@ -8386,7 +8630,7 @@
 </file>
 
 <file path=ppt/slides/slide7.xml><?xml version="1.0" encoding="UTF-8" standalone="yes"?>
-<p:sld xmlns:a="http://schemas.openxmlformats.org/drawingml/2006/main" xmlns:p="http://schemas.openxmlformats.org/presentationml/2006/main" xmlns:r="http://schemas.openxmlformats.org/officeDocument/2006/relationships"><p:cSld><p:spTree><p:nvGrpSpPr>        <p:cNvPr id="1" name=""/>        <p:cNvGrpSpPr/>        <p:nvPr/>      </p:nvGrpSpPr>      <p:grpSpPr>        <a:xfrm>          <a:off x="0" y="0"/>          <a:ext cx="0" cy="0"/>          <a:chOff x="0" y="0"/>          <a:chExt cx="0" cy="0"/>        </a:xfrm>      </p:grpSpPr><p:sp><p:nvSpPr><p:cNvPr id="132" name="TextShape 1"/><p:cNvSpPr txBox="1"/><p:nvPr/></p:nvSpPr><p:spPr><a:xfrm><a:off x="504000" y="301320"/><a:ext cx="9071640" cy="1262160"/></a:xfrm><a:prstGeom prst="rect"><a:avLst/></a:prstGeom></p:spPr><p:txBody><a:bodyPr anchor="ctr" bIns="0" lIns="0" rIns="0" tIns="0" wrap="none"/><a:p><a:pPr algn="ctr"></a:pPr><a:r><a:rPr lang="en-US"></a:rPr><a:t>Case Study</a:t></a:r><a:endParaRPr/></a:p></p:txBody></p:sp><p:sp><p:nvSpPr><p:cNvPr id="133" name="TextShape 2"/><p:cNvSpPr txBox="1"/><p:nvPr/></p:nvSpPr><p:spPr><a:xfrm><a:off x="504000" y="1769040"/><a:ext cx="9071640" cy="974160"/></a:xfrm><a:prstGeom prst="rect"><a:avLst/></a:prstGeom></p:spPr><p:txBody><a:bodyPr bIns="0" lIns="0" rIns="0" tIns="0" wrap="none"/><a:p><a:pPr><a:buSzPct val="45000"/><a:buFont typeface="StarSymbol"/><a:buChar char=""/></a:pPr><a:r><a:rPr lang="en-US"></a:rPr><a:t>Correlation analysis between </a:t></a:r><a:r><a:rPr i="1" lang="en-US"></a:rPr><a:t>Relative Code churn Measures</a:t></a:r><a:r><a:rPr lang="en-US"></a:rPr><a:t> and </a:t></a:r><a:r><a:rPr i="1" lang="en-US"></a:rPr><a:t>System Defect Density</a:t></a:r><a:endParaRPr/></a:p></p:txBody></p:sp><p:sp><p:nvSpPr><p:cNvPr id="134" name="CustomShape 3"/><p:cNvSpPr/><p:nvPr/></p:nvSpPr><p:spPr><a:xfrm><a:off x="3894480" y="3913920"/><a:ext cx="640080" cy="365760"/></a:xfrm><a:prstGeom prst="ellipse"><a:avLst></a:avLst></a:prstGeom><a:solidFill><a:srgbClr val="cccccc"/></a:solidFill><a:ln><a:solidFill><a:srgbClr val="ffff00"/></a:solidFill></a:ln></p:spPr><p:txBody><a:bodyPr anchor="ctr" bIns="45000" lIns="90000" rIns="90000" tIns="45000" wrap="none"/><a:p><a:pPr algn="ctr"></a:pPr><a:r><a:rPr lang="en-US"></a:rPr><a:t>M1</a:t></a:r><a:endParaRPr/></a:p></p:txBody></p:sp><p:sp><p:nvSpPr><p:cNvPr id="135" name="CustomShape 4"/><p:cNvSpPr/><p:nvPr/></p:nvSpPr><p:spPr><a:xfrm><a:off x="3894120" y="4741560"/><a:ext cx="640080" cy="365760"/></a:xfrm><a:prstGeom prst="ellipse"><a:avLst></a:avLst></a:prstGeom><a:solidFill><a:srgbClr val="cccccc"/></a:solidFill><a:ln><a:solidFill><a:srgbClr val="ffff00"/></a:solidFill></a:ln></p:spPr><p:txBody><a:bodyPr anchor="ctr" bIns="45000" lIns="90000" rIns="90000" tIns="45000" wrap="none"/><a:p><a:pPr algn="ctr"></a:pPr><a:r><a:rPr lang="en-US"></a:rPr><a:t>M1</a:t></a:r><a:endParaRPr/></a:p></p:txBody></p:sp><p:sp><p:nvSpPr><p:cNvPr id="136" name="CustomShape 5"/><p:cNvSpPr/><p:nvPr/></p:nvSpPr><p:spPr><a:xfrm><a:off x="3105720" y="4323240"/><a:ext cx="640080" cy="365760"/></a:xfrm><a:prstGeom prst="ellipse"><a:avLst></a:avLst></a:prstGeom><a:solidFill><a:srgbClr val="cccccc"/></a:solidFill><a:ln><a:solidFill><a:srgbClr val="ffff00"/></a:solidFill></a:ln></p:spPr><p:txBody><a:bodyPr anchor="ctr" bIns="45000" lIns="90000" rIns="90000" tIns="45000" wrap="none"/><a:p><a:pPr algn="ctr"></a:pPr><a:r><a:rPr lang="en-US"></a:rPr><a:t>M1</a:t></a:r><a:endParaRPr/></a:p></p:txBody></p:sp><p:sp><p:nvSpPr><p:cNvPr id="137" name="CustomShape 6"/><p:cNvSpPr/><p:nvPr/></p:nvSpPr><p:spPr><a:xfrm><a:off x="5802480" y="5497920"/><a:ext cx="640080" cy="365760"/></a:xfrm><a:prstGeom prst="ellipse"><a:avLst></a:avLst></a:prstGeom><a:solidFill><a:srgbClr val="cccccc"/></a:solidFill><a:ln><a:solidFill><a:srgbClr val="ffff00"/></a:solidFill></a:ln></p:spPr><p:txBody><a:bodyPr anchor="ctr" bIns="45000" lIns="90000" rIns="90000" tIns="45000" wrap="none"/><a:p><a:pPr algn="ctr"></a:pPr><a:r><a:rPr lang="en-US"></a:rPr><a:t>M1</a:t></a:r><a:endParaRPr/></a:p></p:txBody></p:sp><p:sp><p:nvSpPr><p:cNvPr id="138" name="CustomShape 7"/><p:cNvSpPr/><p:nvPr/></p:nvSpPr><p:spPr><a:xfrm><a:off x="5802120" y="4741560"/><a:ext cx="640080" cy="365760"/></a:xfrm><a:prstGeom prst="ellipse"><a:avLst></a:avLst></a:prstGeom><a:solidFill><a:srgbClr val="cccccc"/></a:solidFill><a:ln><a:solidFill><a:srgbClr val="ffff00"/></a:solidFill></a:ln></p:spPr><p:txBody><a:bodyPr anchor="ctr" bIns="45000" lIns="90000" rIns="90000" tIns="45000" wrap="none"/><a:p><a:pPr algn="ctr"></a:pPr><a:r><a:rPr lang="en-US"></a:rPr><a:t>M1</a:t></a:r><a:endParaRPr/></a:p></p:txBody></p:sp><p:sp><p:nvSpPr><p:cNvPr id="139" name="CustomShape 8"/><p:cNvSpPr/><p:nvPr/></p:nvSpPr><p:spPr><a:xfrm><a:off x="5802480" y="3085920"/><a:ext cx="640080" cy="365760"/></a:xfrm><a:prstGeom prst="ellipse"><a:avLst></a:avLst></a:prstGeom><a:solidFill><a:srgbClr val="cccccc"/></a:solidFill><a:ln><a:solidFill><a:srgbClr val="ffff00"/></a:solidFill></a:ln></p:spPr><p:txBody><a:bodyPr anchor="ctr" bIns="45000" lIns="90000" rIns="90000" tIns="45000" wrap="none"/><a:p><a:pPr algn="ctr"></a:pPr><a:r><a:rPr lang="en-US"></a:rPr><a:t>M1</a:t></a:r><a:endParaRPr/></a:p></p:txBody></p:sp><p:sp><p:nvSpPr><p:cNvPr id="140" name="CustomShape 9"/><p:cNvSpPr/><p:nvPr/></p:nvSpPr><p:spPr><a:xfrm><a:off x="5802120" y="3913560"/><a:ext cx="640080" cy="365760"/></a:xfrm><a:prstGeom prst="ellipse"><a:avLst></a:avLst></a:prstGeom><a:solidFill><a:srgbClr val="cccccc"/></a:solidFill><a:ln><a:solidFill><a:srgbClr val="ffff00"/></a:solidFill></a:ln></p:spPr><p:txBody><a:bodyPr anchor="ctr" bIns="45000" lIns="90000" rIns="90000" tIns="45000" wrap="none"/><a:p><a:pPr algn="ctr"></a:pPr><a:r><a:rPr lang="en-US"></a:rPr><a:t>M1</a:t></a:r><a:endParaRPr/></a:p></p:txBody></p:sp><p:sp><p:nvSpPr><p:cNvPr id="141" name="CustomShape 10"/><p:cNvSpPr/><p:nvPr/></p:nvSpPr><p:spPr><a:xfrm><a:off x="4761360" y="4322880"/><a:ext cx="640080" cy="365760"/></a:xfrm><a:prstGeom prst="ellipse"><a:avLst></a:avLst></a:prstGeom><a:solidFill><a:srgbClr val="cccccc"/></a:solidFill><a:ln><a:solidFill><a:srgbClr val="ffff00"/></a:solidFill></a:ln></p:spPr><p:txBody><a:bodyPr anchor="ctr" bIns="45000" lIns="90000" rIns="90000" tIns="45000" wrap="none"/><a:p><a:pPr algn="ctr"></a:pPr><a:r><a:rPr lang="en-US"></a:rPr><a:t>M1</a:t></a:r><a:endParaRPr/></a:p></p:txBody></p:sp><p:cxnSp><p:nvCxnSpPr><p:cNvPr id="142" name="Line 11"/><p:cNvCxnSpPr><a:stCxn id="141" idx="4"/><a:endCxn id="137" idx="2"/></p:cNvCxnSpPr><p:nvPr/></p:nvCxnSpPr><p:spPr><xfrm><a:off x="5081400" y="4688640"/><a:ext cx="721440" cy="992520"/></xfrm><a:prstGeom prst="straightConnector1"><a:avLst/></a:prstGeom><a:ln><a:solidFill><a:srgbClr val="000000"/></a:solidFill><a:headEnd len="med" type="triangle" w="med"/><a:tailEnd len="med" type="triangle" w="med"/></a:ln></p:spPr></p:cxnSp><p:cxnSp><p:nvCxnSpPr><p:cNvPr id="143" name="Line 12"/><p:cNvCxnSpPr><a:stCxn id="141" idx="5"/><a:endCxn id="138" idx="2"/></p:cNvCxnSpPr><p:nvPr/></p:nvCxnSpPr><p:spPr><xfrm><a:off x="5307840" y="4635360"/><a:ext cx="494640" cy="289440"/></xfrm><a:prstGeom prst="straightConnector1"><a:avLst/></a:prstGeom><a:ln><a:solidFill><a:srgbClr val="000000"/></a:solidFill><a:headEnd len="med" type="triangle" w="med"/><a:tailEnd len="med" type="triangle" w="med"/></a:ln></p:spPr></p:cxnSp><p:cxnSp><p:nvCxnSpPr><p:cNvPr id="144" name="Line 13"/><p:cNvCxnSpPr><a:stCxn id="141" idx="7"/><a:endCxn id="140" idx="2"/></p:cNvCxnSpPr><p:nvPr/></p:nvCxnSpPr><p:spPr><xfrm flipH="1"><a:off x="5307840" y="4096440"/><a:ext cx="494640" cy="280080"/></xfrm><a:prstGeom prst="straightConnector1"><a:avLst/></a:prstGeom><a:ln><a:solidFill><a:srgbClr val="000000"/></a:solidFill><a:headEnd len="med" type="triangle" w="med"/><a:tailEnd len="med" type="triangle" w="med"/></a:ln></p:spPr></p:cxnSp><p:cxnSp><p:nvCxnSpPr><p:cNvPr id="145" name="Line 14"/><p:cNvCxnSpPr><a:stCxn id="141" idx="0"/><a:endCxn id="139" idx="2"/></p:cNvCxnSpPr><p:nvPr/></p:nvCxnSpPr><p:spPr><xfrm flipH="1"><a:off x="5081400" y="3268800"/><a:ext cx="721440" cy="1054440"/></xfrm><a:prstGeom prst="straightConnector1"><a:avLst/></a:prstGeom><a:ln><a:solidFill><a:srgbClr val="000000"/></a:solidFill><a:headEnd len="med" type="triangle" w="med"/><a:tailEnd len="med" type="triangle" w="med"/></a:ln></p:spPr></p:cxnSp><p:cxnSp><p:nvCxnSpPr><p:cNvPr id="146" name="Line 15"/><p:cNvCxnSpPr><a:stCxn id="136" idx="5"/><a:endCxn id="135" idx="2"/></p:cNvCxnSpPr><p:nvPr/></p:nvCxnSpPr><p:spPr><xfrm><a:off x="3652200" y="4635720"/><a:ext cx="242280" cy="289080"/></xfrm><a:prstGeom prst="straightConnector1"><a:avLst/></a:prstGeom><a:ln><a:solidFill><a:srgbClr val="000000"/></a:solidFill><a:headEnd len="med" type="triangle" w="med"/><a:tailEnd len="med" type="triangle" w="med"/></a:ln></p:spPr></p:cxnSp><p:cxnSp><p:nvCxnSpPr><p:cNvPr id="147" name="Line 16"/><p:cNvCxnSpPr><a:stCxn id="136" idx="7"/><a:endCxn id="134" idx="2"/></p:cNvCxnSpPr><p:nvPr/></p:nvCxnSpPr><p:spPr><xfrm flipH="1"><a:off x="3652200" y="4096800"/><a:ext cx="242640" cy="280080"/></xfrm><a:prstGeom prst="straightConnector1"><a:avLst/></a:prstGeom><a:ln><a:solidFill><a:srgbClr val="000000"/></a:solidFill><a:headEnd len="med" type="triangle" w="med"/><a:tailEnd len="med" type="triangle" w="med"/></a:ln></p:spPr></p:cxnSp><p:cxnSp><p:nvCxnSpPr><p:cNvPr id="148" name="Line 17"/><p:cNvCxnSpPr><a:stCxn id="134" idx="4"/><a:endCxn id="135" idx="0"/></p:cNvCxnSpPr><p:nvPr/></p:nvCxnSpPr><p:spPr><1pic:xfrm><a:off x="4214160" y="4279680"/><a:ext cx="720" cy="462240"/></1pic:xfrm><a:prstGeom prst="straightConnector1"><a:avLst/></a:prstGeom><a:ln><a:solidFill><a:srgbClr val="000000"/></a:solidFill><a:headEnd len="med" type="triangle" w="med"/><a:tailEnd len="med" type="triangle" w="med"/></a:ln></p:spPr></p:cxnSp><p:graphicFrame><p:nvGraphicFramePr><p:cNvPr id="149" name="Table 18"/><p:cNvGraphicFramePr/><p:nvPr/></p:nvGraphicFramePr><p:xfrm><a:off x="718560" y="2957760"/><a:ext cx="8504280" cy="3078000"/></p:xfrm><a:graphic><a:graphicData uri="http://schemas.openxmlformats.org/drawingml/2006/table"><a:tbl><a:tblPr/><a:tblGrid><a:gridCol w="1314360"/><a:gridCol w="693360"/><a:gridCol w="639360"/><a:gridCol w="567360"/><a:gridCol w="654840"/><a:gridCol w="655200"/><a:gridCol w="615960"/><a:gridCol w="612720"/><a:gridCol w="643320"/><a:gridCol w="2108160"/></a:tblGrid><a:tr h="308160"><a:tc><a:tcPr/></a:tc><a:tc><a:txBody><a:bodyPr bIns="46800" lIns="90000" rIns="90000" tIns="46800" wrap="none"/><a:p><a:r><a:rPr lang="en-US" sz="1200"></a:rPr><a:t>M1</a:t></a:r><a:endParaRPr/></a:p></a:txBody><a:tcPr/></a:tc><a:tc><a:txBody><a:bodyPr bIns="46800" lIns="90000" rIns="90000" tIns="46800" wrap="none"/><a:p><a:r><a:rPr lang="en-US" sz="1200"></a:rPr><a:t>M2</a:t></a:r><a:endParaRPr/></a:p></a:txBody><a:tcPr/></a:tc><a:tc><a:txBody><a:bodyPr bIns="46800" lIns="90000" rIns="90000" tIns="46800" wrap="none"/><a:p><a:r><a:rPr lang="en-US" sz="1200"></a:rPr><a:t>M3</a:t></a:r><a:endParaRPr/></a:p></a:txBody><a:tcPr/></a:tc><a:tc><a:txBody><a:bodyPr bIns="46800" lIns="90000" rIns="90000" tIns="46800" wrap="none"/><a:p><a:r><a:rPr lang="en-US" sz="1200"></a:rPr><a:t>M4</a:t></a:r><a:endParaRPr/></a:p></a:txBody><a:tcPr/></a:tc><a:tc><a:txBody><a:bodyPr bIns="46800" lIns="90000" rIns="90000" tIns="46800" wrap="none"/><a:p><a:r><a:rPr lang="en-US" sz="1200"></a:rPr><a:t>M5</a:t></a:r><a:endParaRPr/></a:p></a:txBody><a:tcPr/></a:tc><a:tc><a:txBody><a:bodyPr bIns="46800" lIns="90000" rIns="90000" tIns="46800" wrap="none"/><a:p><a:r><a:rPr lang="en-US" sz="1200"></a:rPr><a:t>M6</a:t></a:r><a:endParaRPr/></a:p></a:txBody><a:tcPr/></a:tc><a:tc><a:txBody><a:bodyPr bIns="46800" lIns="90000" rIns="90000" tIns="46800" wrap="none"/><a:p><a:r><a:rPr lang="en-US" sz="1200"></a:rPr><a:t>M7</a:t></a:r><a:endParaRPr/></a:p></a:txBody><a:tcPr/></a:tc><a:tc><a:txBody><a:bodyPr bIns="46800" lIns="90000" rIns="90000" tIns="46800" wrap="none"/><a:p><a:r><a:rPr lang="en-US" sz="1200"></a:rPr><a:t>M8</a:t></a:r><a:endParaRPr/></a:p></a:txBody><a:tcPr/></a:tc><a:tc><a:txBody><a:bodyPr bIns="46800" lIns="90000" rIns="90000" tIns="46800" wrap="none"/><a:p><a:r><a:rPr lang="en-US" sz="1100"></a:rPr><a:t>Defects/KLOC</a:t></a:r><a:endParaRPr/></a:p></a:txBody><a:tcPr/></a:tc></a:tr><a:tr h="308160"><a:tc><a:txBody><a:bodyPr bIns="46800" lIns="90000" rIns="90000" tIns="46800" wrap="none"/><a:p><a:r><a:rPr lang="en-US" sz="1200"></a:rPr><a:t>M1</a:t></a:r><a:endParaRPr/></a:p></a:txBody><a:tcPr/></a:tc><a:tc><a:txBody><a:bodyPr bIns="46800" lIns="90000" rIns="90000" tIns="46800" wrap="none"/><a:p><a:r><a:rPr lang="en-US" sz="1200"></a:rPr><a:t>1.0</a:t></a:r><a:endParaRPr/></a:p></a:txBody><a:tcPr/></a:tc><a:tc><a:txBody><a:bodyPr bIns="46800" lIns="90000" rIns="90000" tIns="46800" wrap="none"/><a:p><a:r><a:rPr lang="en-US" sz="1200"></a:rPr><a:t>.834</a:t></a:r><a:endParaRPr/></a:p></a:txBody><a:tcPr/></a:tc><a:tc><a:txBody><a:bodyPr bIns="46800" lIns="90000" rIns="90000" tIns="46800" wrap="none"/><a:p><a:r><a:rPr lang="en-US" sz="1200"></a:rPr><a:t>.795</a:t></a:r><a:endParaRPr/></a:p></a:txBody><a:tcPr/></a:tc><a:tc><a:txBody><a:bodyPr bIns="46800" lIns="90000" rIns="90000" tIns="46800" wrap="none"/><a:p><a:r><a:rPr lang="en-US" sz="1200"></a:rPr><a:t>.413</a:t></a:r><a:endParaRPr/></a:p></a:txBody><a:tcPr/></a:tc><a:tc><a:txBody><a:bodyPr bIns="46800" lIns="90000" rIns="90000" tIns="46800" wrap="none"/><a:p><a:r><a:rPr lang="en-US" sz="1200"></a:rPr><a:t>.707</a:t></a:r><a:endParaRPr/></a:p></a:txBody><a:tcPr/></a:tc><a:tc><a:txBody><a:bodyPr bIns="46800" lIns="90000" rIns="90000" tIns="46800" wrap="none"/><a:p><a:r><a:rPr lang="en-US" sz="1200"></a:rPr><a:t>.651</a:t></a:r><a:endParaRPr/></a:p></a:txBody><a:tcPr/></a:tc><a:tc><a:txBody><a:bodyPr bIns="46800" lIns="90000" rIns="90000" tIns="46800" wrap="none"/><a:p><a:r><a:rPr lang="en-US" sz="1200"></a:rPr><a:t>.466</a:t></a:r><a:endParaRPr/></a:p></a:txBody><a:tcPr/></a:tc><a:tc><a:txBody><a:bodyPr bIns="46800" lIns="90000" rIns="90000" tIns="46800" wrap="none"/><a:p><a:r><a:rPr lang="en-US" sz="1200"></a:rPr><a:t>.588</a:t></a:r><a:endParaRPr/></a:p></a:txBody><a:tcPr/></a:tc><a:tc><a:txBody><a:bodyPr bIns="46800" lIns="90000" rIns="90000" tIns="46800" wrap="none"/><a:p><a:r><a:rPr lang="en-US" sz="1200"></a:rPr><a:t>.883</a:t></a:r><a:endParaRPr/></a:p></a:txBody><a:tcPr/></a:tc></a:tr><a:tr h="308160"><a:tc><a:txBody><a:bodyPr bIns="46800" lIns="90000" rIns="90000" tIns="46800" wrap="none"/><a:p><a:r><a:rPr lang="en-US" sz="1200"></a:rPr><a:t>M2</a:t></a:r><a:endParaRPr/></a:p></a:txBody><a:tcPr/></a:tc><a:tc><a:tcPr/></a:tc><a:tc><a:txBody><a:bodyPr bIns="46800" lIns="90000" rIns="90000" tIns="46800" wrap="none"/><a:p><a:r><a:rPr lang="en-US" sz="1200"></a:rPr><a:t>1.0</a:t></a:r><a:endParaRPr/></a:p></a:txBody><a:tcPr/></a:tc><a:tc><a:txBody><a:bodyPr bIns="46800" lIns="90000" rIns="90000" tIns="46800" wrap="none"/><a:p><a:r><a:rPr lang="en-US" sz="1200"></a:rPr><a:t>.645</a:t></a:r><a:endParaRPr/></a:p></a:txBody><a:tcPr/></a:tc><a:tc><a:txBody><a:bodyPr bIns="46800" lIns="90000" rIns="90000" tIns="46800" wrap="none"/><a:p><a:r><a:rPr lang="en-US" sz="1200"></a:rPr><a:t>.553</a:t></a:r><a:endParaRPr/></a:p></a:txBody><a:tcPr/></a:tc><a:tc><a:txBody><a:bodyPr bIns="46800" lIns="90000" rIns="90000" tIns="46800" wrap="none"/><a:p><a:r><a:rPr lang="en-US" sz="1200"></a:rPr><a:t>.747</a:t></a:r><a:endParaRPr/></a:p></a:txBody><a:tcPr/></a:tc><a:tc><a:txBody><a:bodyPr bIns="46800" lIns="90000" rIns="90000" tIns="46800" wrap="none"/><a:p><a:r><a:rPr lang="en-US" sz="1200"></a:rPr><a:t>.446</a:t></a:r><a:endParaRPr/></a:p></a:txBody><a:tcPr/></a:tc><a:tc><a:txBody><a:bodyPr bIns="46800" lIns="90000" rIns="90000" tIns="46800" wrap="none"/><a:p><a:r><a:rPr lang="en-US" sz="1200"></a:rPr><a:t>.219</a:t></a:r><a:endParaRPr/></a:p></a:txBody><a:tcPr/></a:tc><a:tc><a:txBody><a:bodyPr bIns="46800" lIns="90000" rIns="90000" tIns="46800" wrap="none"/><a:p><a:r><a:rPr lang="en-US" sz="1200"></a:rPr><a:t>.492</a:t></a:r><a:endParaRPr/></a:p></a:txBody><a:tcPr/></a:tc><a:tc><a:txBody><a:bodyPr bIns="46800" lIns="90000" rIns="90000" tIns="46800" wrap="none"/><a:p><a:r><a:rPr lang="en-US" sz="1200"></a:rPr><a:t>.798</a:t></a:r><a:endParaRPr/></a:p></a:txBody><a:tcPr/></a:tc></a:tr><a:tr h="308160"><a:tc><a:txBody><a:bodyPr bIns="46800" lIns="90000" rIns="90000" tIns="46800" wrap="none"/><a:p><a:r><a:rPr lang="en-US" sz="1200"></a:rPr><a:t>M3</a:t></a:r><a:endParaRPr/></a:p></a:txBody><a:tcPr/></a:tc><a:tc><a:tcPr/></a:tc><a:tc><a:tcPr/></a:tc><a:tc><a:txBody><a:bodyPr bIns="46800" lIns="90000" rIns="90000" tIns="46800" wrap="none"/><a:p><a:r><a:rPr lang="en-US" sz="1200"></a:rPr><a:t>1.0</a:t></a:r><a:endParaRPr/></a:p></a:txBody><a:tcPr/></a:tc><a:tc><a:txBody><a:bodyPr bIns="46800" lIns="90000" rIns="90000" tIns="46800" wrap="none"/><a:p><a:r><a:rPr lang="en-US" sz="1200"></a:rPr><a:t>.186</a:t></a:r><a:endParaRPr/></a:p></a:txBody><a:tcPr/></a:tc><a:tc><a:txBody><a:bodyPr bIns="46800" lIns="90000" rIns="90000" tIns="46800" wrap="none"/><a:p><a:r><a:rPr lang="en-US" sz="1200"></a:rPr><a:t>.749</a:t></a:r><a:endParaRPr/></a:p></a:txBody><a:tcPr/></a:tc><a:tc><a:txBody><a:bodyPr bIns="46800" lIns="90000" rIns="90000" tIns="46800" wrap="none"/><a:p><a:r><a:rPr lang="en-US" sz="1200"></a:rPr><a:t>.434</a:t></a:r><a:endParaRPr/></a:p></a:txBody><a:tcPr/></a:tc><a:tc><a:txBody><a:bodyPr bIns="46800" lIns="90000" rIns="90000" tIns="46800" wrap="none"/><a:p><a:r><a:rPr lang="en-US" sz="1200"></a:rPr><a:t>.445</a:t></a:r><a:endParaRPr/></a:p></a:txBody><a:tcPr/></a:tc><a:tc><a:txBody><a:bodyPr bIns="46800" lIns="90000" rIns="90000" tIns="46800" wrap="none"/><a:p><a:r><a:rPr lang="en-US" sz="1200"></a:rPr><a:t>.269</a:t></a:r><a:endParaRPr/></a:p></a:txBody><a:tcPr/></a:tc><a:tc><a:txBody><a:bodyPr bIns="46800" lIns="90000" rIns="90000" tIns="46800" wrap="none"/><a:p><a:r><a:rPr lang="en-US" sz="1200"></a:rPr><a:t>.868</a:t></a:r><a:endParaRPr/></a:p></a:txBody><a:tcPr/></a:tc></a:tr><a:tr h="308160"><a:tc><a:txBody><a:bodyPr bIns="46800" lIns="90000" rIns="90000" tIns="46800" wrap="none"/><a:p><a:r><a:rPr lang="en-US" sz="1200"></a:rPr><a:t>M4</a:t></a:r><a:endParaRPr/></a:p></a:txBody><a:tcPr/></a:tc><a:tc><a:tcPr/></a:tc><a:tc><a:tcPr/></a:tc><a:tc><a:tcPr/></a:tc><a:tc><a:txBody><a:bodyPr bIns="46800" lIns="90000" rIns="90000" tIns="46800" wrap="none"/><a:p><a:r><a:rPr lang="en-US" sz="1200"></a:rPr><a:t>1.0</a:t></a:r><a:endParaRPr/></a:p></a:txBody><a:tcPr/></a:tc><a:tc><a:txBody><a:bodyPr bIns="46800" lIns="90000" rIns="90000" tIns="46800" wrap="none"/><a:p><a:r><a:rPr lang="en-US" sz="1200"></a:rPr><a:t>.531</a:t></a:r><a:endParaRPr/></a:p></a:txBody><a:tcPr/></a:tc><a:tc><a:txBody><a:bodyPr bIns="46800" lIns="90000" rIns="90000" tIns="46800" wrap="none"/><a:p><a:r><a:rPr lang="en-US" sz="1200"></a:rPr><a:t>.429</a:t></a:r><a:endParaRPr/></a:p></a:txBody><a:tcPr/></a:tc><a:tc><a:txBody><a:bodyPr bIns="46800" lIns="90000" rIns="90000" tIns="46800" wrap="none"/><a:p><a:r><a:rPr lang="en-US" sz="1200"></a:rPr><a:t>.210</a:t></a:r><a:endParaRPr/></a:p></a:txBody><a:tcPr/></a:tc><a:tc><a:txBody><a:bodyPr bIns="46800" lIns="90000" rIns="90000" tIns="46800" wrap="none"/><a:p><a:r><a:rPr lang="en-US" sz="1200"></a:rPr><a:t>.631</a:t></a:r><a:endParaRPr/></a:p></a:txBody><a:tcPr/></a:tc><a:tc><a:txBody><a:bodyPr bIns="46800" lIns="90000" rIns="90000" tIns="46800" wrap="none"/><a:p><a:r><a:rPr lang="en-US" sz="1200"></a:rPr><a:t>.288</a:t></a:r><a:endParaRPr/></a:p></a:txBody><a:tcPr/></a:tc></a:tr><a:tr h="308160"><a:tc><a:txBody><a:bodyPr bIns="46800" lIns="90000" rIns="90000" tIns="46800" wrap="none"/><a:p><a:r><a:rPr lang="en-US" sz="1200"></a:rPr><a:t>M5</a:t></a:r><a:endParaRPr/></a:p></a:txBody><a:tcPr/></a:tc><a:tc><a:tcPr/></a:tc><a:tc><a:tcPr/></a:tc><a:tc><a:tcPr/></a:tc><a:tc><a:tcPr/></a:tc><a:tc><a:txBody><a:bodyPr bIns="46800" lIns="90000" rIns="90000" tIns="46800" wrap="none"/><a:p><a:r><a:rPr lang="en-US" sz="1200"></a:rPr><a:t>1.0</a:t></a:r><a:endParaRPr/></a:p></a:txBody><a:tcPr/></a:tc><a:tc><a:txBody><a:bodyPr bIns="46800" lIns="90000" rIns="90000" tIns="46800" wrap="none"/><a:p><a:r><a:rPr lang="en-US" sz="1200"></a:rPr><a:t>.263</a:t></a:r><a:endParaRPr/></a:p></a:txBody><a:tcPr/></a:tc><a:tc><a:txBody><a:bodyPr bIns="46800" lIns="90000" rIns="90000" tIns="46800" wrap="none"/><a:p><a:r><a:rPr lang="en-US" sz="1200"></a:rPr><a:t>.201</a:t></a:r><a:endParaRPr/></a:p></a:txBody><a:tcPr/></a:tc><a:tc><a:txBody><a:bodyPr bIns="46800" lIns="90000" rIns="90000" tIns="46800" wrap="none"/><a:p><a:r><a:rPr lang="en-US" sz="1200"></a:rPr><a:t>.390</a:t></a:r><a:endParaRPr/></a:p></a:txBody><a:tcPr/></a:tc><a:tc><a:txBody><a:bodyPr bIns="46800" lIns="90000" rIns="90000" tIns="46800" wrap="none"/><a:p><a:r><a:rPr lang="en-US" sz="1200"></a:rPr><a:t>.729</a:t></a:r><a:endParaRPr/></a:p></a:txBody><a:tcPr/></a:tc></a:tr><a:tr h="308160"><a:tc><a:txBody><a:bodyPr bIns="46800" lIns="90000" rIns="90000" tIns="46800" wrap="none"/><a:p><a:r><a:rPr lang="en-US" sz="1200"></a:rPr><a:t>M6</a:t></a:r><a:endParaRPr/></a:p></a:txBody><a:tcPr/></a:tc><a:tc><a:tcPr/></a:tc><a:tc><a:tcPr/></a:tc><a:tc><a:tcPr/></a:tc><a:tc><a:tcPr/></a:tc><a:tc><a:tcPr/></a:tc><a:tc><a:txBody><a:bodyPr bIns="46800" lIns="90000" rIns="90000" tIns="46800" wrap="none"/><a:p><a:r><a:rPr lang="en-US" sz="1200"></a:rPr><a:t>1.0</a:t></a:r><a:endParaRPr/></a:p></a:txBody><a:tcPr/></a:tc><a:tc><a:txBody><a:bodyPr bIns="46800" lIns="90000" rIns="90000" tIns="46800" wrap="none"/><a:p><a:r><a:rPr lang="en-US" sz="1200"></a:rPr><a:t>.701</a:t></a:r><a:endParaRPr/></a:p></a:txBody><a:tcPr/></a:tc><a:tc><a:txBody><a:bodyPr bIns="46800" lIns="90000" rIns="90000" tIns="46800" wrap="none"/><a:p><a:r><a:rPr lang="en-US" sz="1200"></a:rPr><a:t>.843</a:t></a:r><a:endParaRPr/></a:p></a:txBody><a:tcPr/></a:tc><a:tc><a:txBody><a:bodyPr bIns="46800" lIns="90000" rIns="90000" tIns="46800" wrap="none"/><a:p><a:r><a:rPr lang="en-US" sz="1200"></a:rPr><a:t>.374</a:t></a:r><a:endParaRPr/></a:p></a:txBody><a:tcPr/></a:tc></a:tr><a:tr h="308160"><a:tc><a:txBody><a:bodyPr bIns="46800" lIns="90000" rIns="90000" tIns="46800" wrap="none"/><a:p><a:r><a:rPr lang="en-US" sz="1200"></a:rPr><a:t>M7</a:t></a:r><a:endParaRPr/></a:p></a:txBody><a:tcPr/></a:tc><a:tc><a:tcPr/></a:tc><a:tc><a:tcPr/></a:tc><a:tc><a:tcPr/></a:tc><a:tc><a:tcPr/></a:tc><a:tc><a:tcPr/></a:tc><a:tc><a:tcPr/></a:tc><a:tc><a:txBody><a:bodyPr bIns="46800" lIns="90000" rIns="90000" tIns="46800" wrap="none"/><a:p><a:r><a:rPr lang="en-US" sz="1200"></a:rPr><a:t>1.0</a:t></a:r><a:endParaRPr/></a:p></a:txBody><a:tcPr/></a:tc><a:tc><a:txBody><a:bodyPr bIns="46800" lIns="90000" rIns="90000" tIns="46800" wrap="none"/><a:p><a:r><a:rPr lang="en-US" sz="1200"></a:rPr><a:t>.507</a:t></a:r><a:endParaRPr/></a:p></a:txBody><a:tcPr/></a:tc><a:tc><a:txBody><a:bodyPr bIns="46800" lIns="90000" rIns="90000" tIns="46800" wrap="none"/><a:p><a:r><a:rPr lang="en-US" sz="1200"></a:rPr><a:t>.288</a:t></a:r><a:endParaRPr/></a:p></a:txBody><a:tcPr/></a:tc></a:tr><a:tr h="308160"><a:tc><a:txBody><a:bodyPr bIns="46800" lIns="90000" rIns="90000" tIns="46800" wrap="none"/><a:p><a:r><a:rPr lang="en-US" sz="1200"></a:rPr><a:t>M8</a:t></a:r><a:endParaRPr/></a:p></a:txBody><a:tcPr/></a:tc><a:tc><a:tcPr/></a:tc><a:tc><a:tcPr/></a:tc><a:tc><a:tcPr/></a:tc><a:tc><a:tcPr/></a:tc><a:tc><a:tcPr/></a:tc><a:tc><a:tcPr/></a:tc><a:tc><a:tcPr/></a:tc><a:tc><a:txBody><a:bodyPr bIns="46800" lIns="90000" rIns="90000" tIns="46800" wrap="none"/><a:p><a:r><a:rPr lang="en-US" sz="1200"></a:rPr><a:t>1.0</a:t></a:r><a:endParaRPr/></a:p></a:txBody><a:tcPr/></a:tc><a:tc><a:txBody><a:bodyPr bIns="46800" lIns="90000" rIns="90000" tIns="46800" wrap="none"/><a:p><a:r><a:rPr lang="en-US" sz="1200"></a:rPr><a:t>.262</a:t></a:r><a:endParaRPr/></a:p></a:txBody><a:tcPr/></a:tc></a:tr><a:tr h="304920"><a:tc><a:txBody><a:bodyPr bIns="46800" lIns="90000" rIns="90000" tIns="46800" wrap="none"/><a:p><a:r><a:rPr lang="en-US" sz="1100"></a:rPr><a:t>Defects/KLOC</a:t></a:r><a:endParaRPr/></a:p></a:txBody><a:tcPr/></a:tc><a:tc><a:tcPr/></a:tc><a:tc><a:tcPr/></a:tc><a:tc><a:tcPr/></a:tc><a:tc><a:tcPr/></a:tc><a:tc><a:tcPr/></a:tc><a:tc><a:tcPr/></a:tc><a:tc><a:tcPr/></a:tc><a:tc><a:tcPr/></a:tc><a:tc><a:txBody><a:bodyPr bIns="46800" lIns="90000" rIns="90000" tIns="46800" wrap="none"/><a:p><a:r><a:rPr lang="en-US" sz="1200"></a:rPr><a:t>1.0</a:t></a:r><a:endParaRPr/></a:p></a:txBody><a:tcPr/></a:tc></a:tr></a:tbl></a:graphicData></a:graphic></p:graphicFrame><p:graphicFrame><p:nvGraphicFramePr><p:cNvPr id="150" name="Table 19"/><p:cNvGraphicFramePr/><p:nvPr/></p:nvGraphicFramePr><p:xfrm><a:off x="2374920" y="6071040"/><a:ext cx="5075280" cy="745560"/></p:xfrm><a:graphic><a:graphicData uri="http://schemas.openxmlformats.org/drawingml/2006/table"><a:tbl><a:tblPr/><a:tblGrid><a:gridCol w="5075640"/></a:tblGrid><a:tr h="745920"><a:tc><a:tcPr/></a:tc></a:tr></a:tbl></a:graphicData></a:graphic></p:graphicFrame><p:pic><p:nvPicPr><p:cNvPr descr="" id="151" name=""/><p:cNvPicPr/><p:nvPr/></p:nvPicPr><p:blipFill><a:blip r:embed="rId1"></a:blip><a:stretch><a:fillRect/></a:stretch></p:blipFill><p:spPr><a:xfrm><a:off x="3677760" y="6161760"/><a:ext cx="2457000" cy="552240"/></a:xfrm><a:prstGeom prst="rect"><a:avLst/></a:prstGeom></p:spPr></p:pic><p:sp><p:nvSpPr><p:cNvPr id="152" name="TextShape 20"/><p:cNvSpPr txBox="1"/><p:nvPr/></p:nvSpPr><p:spPr><a:xfrm><a:off x="2586600" y="7096320"/><a:ext cx="5074200" cy="354600"/></a:xfrm><a:prstGeom prst="rect"><a:avLst/></a:prstGeom></p:spPr><p:txBody><a:bodyPr bIns="45000" lIns="90000" rIns="90000" tIns="45000" wrap="none"/><a:p><a:r><a:rPr lang="en-US" sz="1400"><a:solidFill><a:srgbClr val="e6e6e6"/></a:solidFill></a:rPr><a:t>Source of reference http://dl.acm.org/citation.cfm?id=1062514</a:t></a:r><a:endParaRPr/></a:p></p:txBody></p:sp></p:spTree></p:cSld><p:timing><p:tnLst><p:par><p:cTn dur="indefinite" id="55" nodeType="tmRoot" restart="never"><p:childTnLst><p:seq><p:cTn id="56" nodeType="mainSeq"><p:childTnLst><p:par><p:cTn fill="freeze" id="57"><p:stCondLst><p:cond delay="indefinite"/></p:stCondLst><p:childTnLst><p:par><p:cTn fill="freeze" id="58"><p:stCondLst><p:cond delay="0"/></p:stCondLst><p:childTnLst><p:par><p:cTn fill="hold" id="59" nodeType="clickEffect" presetClass="entr" presetID="21" presetSubtype="1"><p:stCondLst><p:cond delay="0"/></p:stCondLst><p:childTnLst><p:set><p:cBhvr><p:cTn dur="1" fill="hold" id="60"><p:stCondLst><p:cond delay="0"/></p:stCondLst></p:cTn><p:tgtEl><p:spTgt spid="149"></p:spTgt></p:tgtEl><p:attrNameLst><p:attrName>style.visibility</p:attrName></p:attrNameLst></p:cBhvr><p:to><p:strVal val="visible"/></p:to></p:set><p:animEffect filter="wheel(1)" transition="in"><p:cBhvr additive="repl"><p:cTn dur="2000" fill="freeze" id="61"></p:cTn><p:tgtEl><p:spTgt spid="149"></p:spTgt></p:tgtEl></p:cBhvr></p:animEffect></p:childTnLst></p:cTn></p:par></p:childTnLst></p:cTn></p:par></p:childTnLst></p:cTn></p:par><p:par><p:cTn fill="freeze" id="62"><p:stCondLst><p:cond delay="indefinite"/></p:stCondLst><p:childTnLst><p:par><p:cTn fill="freeze" id="63"><p:stCondLst><p:cond delay="0"/></p:stCondLst><p:childTnLst><p:par><p:cTn fill="hold" id="64" nodeType="clickEffect" presetClass="entr" presetID="2" presetSubtype="4"><p:stCondLst><p:cond delay="0"/></p:stCondLst><p:childTnLst><p:set><p:cBhvr><p:cTn dur="1" fill="hold" id="65"><p:stCondLst><p:cond delay="0"/></p:stCondLst></p:cTn><p:tgtEl><p:spTgt spid="-1"></p:spTgt></p:tgtEl><p:attrNameLst><p:attrName>style.visibility</p:attrName></p:attrNameLst></p:cBhvr><p:to><p:strVal val="visible"/></p:to></p:set><p:anim calcmode="lin" valueType="num"><p:cBhvr additive="repl"><p:cTn dur="500" fill="hold" id="66"></p:cTn><p:tgtEl><p:spTgt spid="-1"></p:spTgt></p:tgtEl><p:attrNameLst><p:attrName>ppt_x</p:attrName></p:attrNameLst></p:cBhvr><p:tavLst><p:tav tm="0"><p:val><p:strVal val="#ppt_x"/></p:val></p:tav><p:tav tm="100000"><p:val><p:strVal val="#ppt_x"/></p:val></p:tav></p:tavLst></p:anim><p:anim calcmode="lin" valueType="num"><p:cBhvr additive="repl"><p:cTn dur="500" fill="hold" id="67"></p:cTn><p:tgtEl><p:spTgt spid="-1"></p:spTgt></p:tgtEl><p:attrNameLst><p:attrName>ppt_y</p:attrName></p:attrNameLst></p:cBhvr><p:tavLst><p:tav tm="0"><p:val><p:strVal val="1+#ppt_h/2"/></p:val></p:tav><p:tav tm="100000"><p:val><p:strVal val="#ppt_y"/></p:val></p:tav></p:tavLst></p:anim></p:childTnLst></p:cTn></p:par></p:childTnLst></p:cTn></p:par></p:childTnLst></p:cTn></p:par></p:childTnLst></p:cTn><p:prevCondLst><p:cond delay="0" evt="onPrev"><p:tgtEl><p:sldTgt/></p:tgtEl></p:cond></p:prevCondLst><p:nextCondLst><p:cond delay="0" evt="onNext"><p:tgtEl><p:sldTgt/></p:tgtEl></p:cond></p:nextCondLst></p:seq></p:childTnLst></p:cTn></p:par></p:tnLst></p:timing></p:sld>
+<p:sld xmlns:a="http://schemas.openxmlformats.org/drawingml/2006/main" xmlns:p="http://schemas.openxmlformats.org/presentationml/2006/main" xmlns:r="http://schemas.openxmlformats.org/officeDocument/2006/relationships"><p:cSld><p:spTree><p:nvGrpSpPr>        <p:cNvPr id="1" name=""/>        <p:cNvGrpSpPr/>        <p:nvPr/>      </p:nvGrpSpPr>      <p:grpSpPr>        <a:xfrm>          <a:off x="0" y="0"/>          <a:ext cx="0" cy="0"/>          <a:chOff x="0" y="0"/>          <a:chExt cx="0" cy="0"/>        </a:xfrm>      </p:grpSpPr><p:sp><p:nvSpPr><p:cNvPr id="132" name="TextShape 1"/><p:cNvSpPr txBox="1"/><p:nvPr/></p:nvSpPr><p:spPr><a:xfrm><a:off x="504000" y="301320"/><a:ext cx="9071640" cy="1262160"/></a:xfrm><a:prstGeom prst="rect"><a:avLst/></a:prstGeom></p:spPr><p:txBody><a:bodyPr anchor="ctr" bIns="0" lIns="0" rIns="0" tIns="0" wrap="none"/><a:p><a:pPr algn="ctr"></a:pPr><a:r><a:rPr lang="en-US"></a:rPr><a:t>Case Study</a:t></a:r><a:endParaRPr/></a:p></p:txBody></p:sp><p:sp><p:nvSpPr><p:cNvPr id="133" name="TextShape 2"/><p:cNvSpPr txBox="1"/><p:nvPr/></p:nvSpPr><p:spPr><a:xfrm><a:off x="504000" y="1769040"/><a:ext cx="9071640" cy="793080"/></a:xfrm><a:prstGeom prst="rect"><a:avLst/></a:prstGeom></p:spPr><p:txBody><a:bodyPr bIns="0" lIns="0" rIns="0" tIns="0" wrap="none"/><a:p><a:pPr><a:buSzPct val="45000"/><a:buFont typeface="StarSymbol"/><a:buChar char=""/></a:pPr><a:r><a:rPr lang="en-US" sz="2800"></a:rPr><a:t>Correlation analysis between </a:t></a:r><a:r><a:rPr i="1" lang="en-US" sz="2800"></a:rPr><a:t>Relative Code-Churn Measures</a:t></a:r><a:r><a:rPr lang="en-US" sz="2800"></a:rPr><a:t> and </a:t></a:r><a:r><a:rPr i="1" lang="en-US" sz="2800"></a:rPr><a:t>System Defect Density</a:t></a:r><a:endParaRPr/></a:p></p:txBody></p:sp><p:graphicFrame><p:nvGraphicFramePr><p:cNvPr id="134" name="Table 3"/><p:cNvGraphicFramePr/><p:nvPr/></p:nvGraphicFramePr><p:xfrm><a:off x="2374920" y="5999040"/><a:ext cx="5075280" cy="745560"/></p:xfrm><a:graphic><a:graphicData uri="http://schemas.openxmlformats.org/drawingml/2006/table"><a:tbl><a:tblPr/><a:tblGrid><a:gridCol w="5075640"/></a:tblGrid><a:tr h="745920"><a:tc><a:tcPr/></a:tc></a:tr></a:tbl></a:graphicData></a:graphic></p:graphicFrame><p:pic><p:nvPicPr><p:cNvPr descr="" id="135" name=""/><p:cNvPicPr/><p:nvPr/></p:nvPicPr><p:blipFill><a:blip r:embed="rId1"></a:blip><a:stretch><a:fillRect/></a:stretch></p:blipFill><p:spPr><a:xfrm><a:off x="3677760" y="6089760"/><a:ext cx="2457000" cy="552240"/></a:xfrm><a:prstGeom prst="rect"><a:avLst/></a:prstGeom></p:spPr></p:pic><p:sp><p:nvSpPr><p:cNvPr id="136" name="TextShape 4"/><p:cNvSpPr txBox="1"/><p:nvPr/></p:nvSpPr><p:spPr><a:xfrm><a:off x="2586600" y="7096320"/><a:ext cx="5074200" cy="354600"/></a:xfrm><a:prstGeom prst="rect"><a:avLst/></a:prstGeom></p:spPr><p:txBody><a:bodyPr bIns="45000" lIns="90000" rIns="90000" tIns="45000" wrap="none"/><a:p><a:r><a:rPr lang="en-US" sz="1400"><a:solidFill><a:srgbClr val="e6e6e6"/></a:solidFill></a:rPr><a:t>Source of reference http://dl.acm.org/citation.cfm?id=1062514</a:t></a:r><a:endParaRPr/></a:p></p:txBody></p:sp><p:sp><p:nvSpPr><p:cNvPr id="137" name="CustomShape 5"/><p:cNvSpPr/><p:nvPr/></p:nvSpPr><p:spPr><a:xfrm><a:off x="3894480" y="3877920"/><a:ext cx="640080" cy="365760"/></a:xfrm><a:prstGeom prst="ellipse"><a:avLst></a:avLst></a:prstGeom><a:solidFill><a:srgbClr val="cccccc"/></a:solidFill><a:ln><a:solidFill><a:srgbClr val="ffff00"/></a:solidFill></a:ln></p:spPr><p:txBody><a:bodyPr anchor="ctr" bIns="45000" lIns="90000" rIns="90000" tIns="45000" wrap="none"/><a:p><a:pPr algn="ctr"></a:pPr><a:r><a:rPr lang="en-US"></a:rPr><a:t>M1</a:t></a:r><a:endParaRPr/></a:p></p:txBody></p:sp><p:sp><p:nvSpPr><p:cNvPr id="138" name="CustomShape 6"/><p:cNvSpPr/><p:nvPr/></p:nvSpPr><p:spPr><a:xfrm><a:off x="3894120" y="4705560"/><a:ext cx="640080" cy="365760"/></a:xfrm><a:prstGeom prst="ellipse"><a:avLst></a:avLst></a:prstGeom><a:solidFill><a:srgbClr val="cccccc"/></a:solidFill><a:ln><a:solidFill><a:srgbClr val="ffff00"/></a:solidFill></a:ln></p:spPr><p:txBody><a:bodyPr anchor="ctr" bIns="45000" lIns="90000" rIns="90000" tIns="45000" wrap="none"/><a:p><a:pPr algn="ctr"></a:pPr><a:r><a:rPr lang="en-US"></a:rPr><a:t>M2</a:t></a:r><a:endParaRPr/></a:p></p:txBody></p:sp><p:sp><p:nvSpPr><p:cNvPr id="139" name="CustomShape 7"/><p:cNvSpPr/><p:nvPr/></p:nvSpPr><p:spPr><a:xfrm><a:off x="3105720" y="4287240"/><a:ext cx="640080" cy="365760"/></a:xfrm><a:prstGeom prst="ellipse"><a:avLst></a:avLst></a:prstGeom><a:solidFill><a:srgbClr val="cccccc"/></a:solidFill><a:ln><a:solidFill><a:srgbClr val="ffff00"/></a:solidFill></a:ln></p:spPr><p:txBody><a:bodyPr anchor="ctr" bIns="45000" lIns="90000" rIns="90000" tIns="45000" wrap="none"/><a:p><a:pPr algn="ctr"></a:pPr><a:r><a:rPr lang="en-US"></a:rPr><a:t>M7</a:t></a:r><a:endParaRPr/></a:p></p:txBody></p:sp><p:sp><p:nvSpPr><p:cNvPr id="140" name="CustomShape 8"/><p:cNvSpPr/><p:nvPr/></p:nvSpPr><p:spPr><a:xfrm><a:off x="5802480" y="5461920"/><a:ext cx="640080" cy="365760"/></a:xfrm><a:prstGeom prst="ellipse"><a:avLst></a:avLst></a:prstGeom><a:solidFill><a:srgbClr val="cccccc"/></a:solidFill><a:ln><a:solidFill><a:srgbClr val="ffff00"/></a:solidFill></a:ln></p:spPr><p:txBody><a:bodyPr anchor="ctr" bIns="45000" lIns="90000" rIns="90000" tIns="45000" wrap="none"/><a:p><a:pPr algn="ctr"></a:pPr><a:r><a:rPr lang="en-US"></a:rPr><a:t>M6</a:t></a:r><a:endParaRPr/></a:p></p:txBody></p:sp><p:sp><p:nvSpPr><p:cNvPr id="141" name="CustomShape 9"/><p:cNvSpPr/><p:nvPr/></p:nvSpPr><p:spPr><a:xfrm><a:off x="5802120" y="4705560"/><a:ext cx="640080" cy="365760"/></a:xfrm><a:prstGeom prst="ellipse"><a:avLst></a:avLst></a:prstGeom><a:solidFill><a:srgbClr val="cccccc"/></a:solidFill><a:ln><a:solidFill><a:srgbClr val="ffff00"/></a:solidFill></a:ln></p:spPr><p:txBody><a:bodyPr anchor="ctr" bIns="45000" lIns="90000" rIns="90000" tIns="45000" wrap="none"/><a:p><a:pPr algn="ctr"></a:pPr><a:r><a:rPr lang="en-US"></a:rPr><a:t>M5</a:t></a:r><a:endParaRPr/></a:p></p:txBody></p:sp><p:sp><p:nvSpPr><p:cNvPr id="142" name="CustomShape 10"/><p:cNvSpPr/><p:nvPr/></p:nvSpPr><p:spPr><a:xfrm><a:off x="5802480" y="3049920"/><a:ext cx="640080" cy="365760"/></a:xfrm><a:prstGeom prst="ellipse"><a:avLst></a:avLst></a:prstGeom><a:solidFill><a:srgbClr val="cccccc"/></a:solidFill><a:ln><a:solidFill><a:srgbClr val="ffff00"/></a:solidFill></a:ln></p:spPr><p:txBody><a:bodyPr anchor="ctr" bIns="45000" lIns="90000" rIns="90000" tIns="45000" wrap="none"/><a:p><a:pPr algn="ctr"></a:pPr><a:r><a:rPr lang="en-US"></a:rPr><a:t>M3</a:t></a:r><a:endParaRPr/></a:p></p:txBody></p:sp><p:sp><p:nvSpPr><p:cNvPr id="143" name="CustomShape 11"/><p:cNvSpPr/><p:nvPr/></p:nvSpPr><p:spPr><a:xfrm><a:off x="5802120" y="3877560"/><a:ext cx="640080" cy="365760"/></a:xfrm><a:prstGeom prst="ellipse"><a:avLst></a:avLst></a:prstGeom><a:solidFill><a:srgbClr val="cccccc"/></a:solidFill><a:ln><a:solidFill><a:srgbClr val="ffff00"/></a:solidFill></a:ln></p:spPr><p:txBody><a:bodyPr anchor="ctr" bIns="45000" lIns="90000" rIns="90000" tIns="45000" wrap="none"/><a:p><a:pPr algn="ctr"></a:pPr><a:r><a:rPr lang="en-US"></a:rPr><a:t>M4</a:t></a:r><a:endParaRPr/></a:p></p:txBody></p:sp><p:sp><p:nvSpPr><p:cNvPr id="144" name="CustomShape 12"/><p:cNvSpPr/><p:nvPr/></p:nvSpPr><p:spPr><a:xfrm><a:off x="4761360" y="4286880"/><a:ext cx="640080" cy="365760"/></a:xfrm><a:prstGeom prst="ellipse"><a:avLst></a:avLst></a:prstGeom><a:solidFill><a:srgbClr val="cccccc"/></a:solidFill><a:ln><a:solidFill><a:srgbClr val="ffff00"/></a:solidFill></a:ln></p:spPr><p:txBody><a:bodyPr anchor="ctr" bIns="45000" lIns="90000" rIns="90000" tIns="45000" wrap="none"/><a:p><a:pPr algn="ctr"></a:pPr><a:r><a:rPr lang="en-US"></a:rPr><a:t>M8</a:t></a:r><a:endParaRPr/></a:p></p:txBody></p:sp><p:cxnSp><p:nvCxnSpPr><p:cNvPr id="145" name="Line 13"/><p:cNvCxnSpPr><a:stCxn id="144" idx="4"/><a:endCxn id="140" idx="2"/></p:cNvCxnSpPr><p:nvPr/></p:nvCxnSpPr><p:spPr><xfrm><a:off x="5081400" y="4652640"/><a:ext cx="721440" cy="992520"/></xfrm><a:prstGeom prst="straightConnector1"><a:avLst/></a:prstGeom><a:ln><a:solidFill><a:srgbClr val="000000"/></a:solidFill><a:headEnd len="med" type="triangle" w="med"/><a:tailEnd len="med" type="triangle" w="med"/></a:ln></p:spPr></p:cxnSp><p:cxnSp><p:nvCxnSpPr><p:cNvPr id="146" name="Line 14"/><p:cNvCxnSpPr><a:stCxn id="144" idx="5"/><a:endCxn id="141" idx="2"/></p:cNvCxnSpPr><p:nvPr/></p:nvCxnSpPr><p:spPr><xfrm><a:off x="5307840" y="4599360"/><a:ext cx="494640" cy="289440"/></xfrm><a:prstGeom prst="straightConnector1"><a:avLst/></a:prstGeom><a:ln><a:solidFill><a:srgbClr val="000000"/></a:solidFill><a:headEnd len="med" type="triangle" w="med"/><a:tailEnd len="med" type="triangle" w="med"/></a:ln></p:spPr></p:cxnSp><p:cxnSp><p:nvCxnSpPr><p:cNvPr id="147" name="Line 15"/><p:cNvCxnSpPr><a:stCxn id="144" idx="7"/><a:endCxn id="143" idx="2"/></p:cNvCxnSpPr><p:nvPr/></p:nvCxnSpPr><p:spPr><xfrm flipH="1"><a:off x="5307840" y="4060440"/><a:ext cx="494640" cy="280080"/></xfrm><a:prstGeom prst="straightConnector1"><a:avLst/></a:prstGeom><a:ln><a:solidFill><a:srgbClr val="000000"/></a:solidFill><a:headEnd len="med" type="triangle" w="med"/><a:tailEnd len="med" type="triangle" w="med"/></a:ln></p:spPr></p:cxnSp><p:cxnSp><p:nvCxnSpPr><p:cNvPr id="148" name="Line 16"/><p:cNvCxnSpPr><a:stCxn id="144" idx="0"/><a:endCxn id="142" idx="2"/></p:cNvCxnSpPr><p:nvPr/></p:nvCxnSpPr><p:spPr><xfrm flipH="1"><a:off x="5081400" y="3232800"/><a:ext cx="721440" cy="1054440"/></xfrm><a:prstGeom prst="straightConnector1"><a:avLst/></a:prstGeom><a:ln><a:solidFill><a:srgbClr val="000000"/></a:solidFill><a:headEnd len="med" type="triangle" w="med"/><a:tailEnd len="med" type="triangle" w="med"/></a:ln></p:spPr></p:cxnSp><p:cxnSp><p:nvCxnSpPr><p:cNvPr id="149" name="Line 17"/><p:cNvCxnSpPr><a:stCxn id="139" idx="5"/><a:endCxn id="138" idx="2"/></p:cNvCxnSpPr><p:nvPr/></p:nvCxnSpPr><p:spPr><xfrm><a:off x="3652200" y="4599720"/><a:ext cx="242280" cy="289080"/></xfrm><a:prstGeom prst="straightConnector1"><a:avLst/></a:prstGeom><a:ln><a:solidFill><a:srgbClr val="000000"/></a:solidFill><a:headEnd len="med" type="triangle" w="med"/><a:tailEnd len="med" type="triangle" w="med"/></a:ln></p:spPr></p:cxnSp><p:cxnSp><p:nvCxnSpPr><p:cNvPr id="150" name="Line 18"/><p:cNvCxnSpPr><a:stCxn id="139" idx="7"/><a:endCxn id="137" idx="2"/></p:cNvCxnSpPr><p:nvPr/></p:nvCxnSpPr><p:spPr><xfrm flipH="1"><a:off x="3652200" y="4060800"/><a:ext cx="242640" cy="280080"/></xfrm><a:prstGeom prst="straightConnector1"><a:avLst/></a:prstGeom><a:ln><a:solidFill><a:srgbClr val="000000"/></a:solidFill><a:headEnd len="med" type="triangle" w="med"/><a:tailEnd len="med" type="triangle" w="med"/></a:ln></p:spPr></p:cxnSp><p:cxnSp><p:nvCxnSpPr><p:cNvPr id="151" name="Line 19"/><p:cNvCxnSpPr><a:stCxn id="137" idx="4"/><a:endCxn id="138" idx="0"/></p:cNvCxnSpPr><p:nvPr/></p:nvCxnSpPr><p:spPr><1pic:xfrm><a:off x="4214160" y="4243680"/><a:ext cx="720" cy="462240"/></1pic:xfrm><a:prstGeom prst="straightConnector1"><a:avLst/></a:prstGeom><a:ln><a:solidFill><a:srgbClr val="000000"/></a:solidFill><a:headEnd len="med" type="triangle" w="med"/><a:tailEnd len="med" type="triangle" w="med"/></a:ln></p:spPr></p:cxnSp><p:cxnSp><p:nvCxnSpPr><p:cNvPr id="152" name="Line 20"/><p:cNvCxnSpPr><a:stCxn id="142" idx="4"/><a:endCxn id="143" idx="0"/></p:cNvCxnSpPr><p:nvPr/></p:nvCxnSpPr><p:spPr><1pic:xfrm><a:off x="6122160" y="3415680"/><a:ext cx="720" cy="462240"/></1pic:xfrm><a:prstGeom prst="straightConnector1"><a:avLst/></a:prstGeom><a:ln><a:solidFill><a:srgbClr val="000000"/></a:solidFill><a:headEnd len="med" type="triangle" w="med"/><a:tailEnd len="med" type="triangle" w="med"/></a:ln></p:spPr></p:cxnSp><p:cxnSp><p:nvCxnSpPr><p:cNvPr id="153" name="Line 21"/><p:cNvCxnSpPr><a:stCxn id="141" idx="4"/><a:endCxn id="140" idx="0"/></p:cNvCxnSpPr><p:nvPr/></p:nvCxnSpPr><p:spPr><xfrm><a:off x="6122160" y="5071320"/><a:ext cx="720" cy="390960"/></xfrm><a:prstGeom prst="straightConnector1"><a:avLst/></a:prstGeom><a:ln><a:solidFill><a:srgbClr val="000000"/></a:solidFill><a:headEnd len="med" type="triangle" w="med"/><a:tailEnd len="med" type="triangle" w="med"/></a:ln></p:spPr></p:cxnSp><p:graphicFrame><p:nvGraphicFramePr><p:cNvPr id="154" name="Table 22"/><p:cNvGraphicFramePr/><p:nvPr/></p:nvGraphicFramePr><p:xfrm><a:off x="723600" y="2774880"/><a:ext cx="8504280" cy="3078000"/></p:xfrm><a:graphic><a:graphicData uri="http://schemas.openxmlformats.org/drawingml/2006/table"><a:tbl><a:tblPr/><a:tblGrid><a:gridCol w="1314360"/><a:gridCol w="693360"/><a:gridCol w="639360"/><a:gridCol w="567360"/><a:gridCol w="654840"/><a:gridCol w="655200"/><a:gridCol w="615960"/><a:gridCol w="612720"/><a:gridCol w="643320"/><a:gridCol w="2108160"/></a:tblGrid><a:tr h="308160"><a:tc><a:tcPr/></a:tc><a:tc><a:txBody><a:bodyPr bIns="46800" lIns="90000" rIns="90000" tIns="46800" wrap="none"/><a:p><a:r><a:rPr lang="en-US" sz="1200"></a:rPr><a:t>M1</a:t></a:r><a:endParaRPr/></a:p></a:txBody><a:tcPr/></a:tc><a:tc><a:txBody><a:bodyPr bIns="46800" lIns="90000" rIns="90000" tIns="46800" wrap="none"/><a:p><a:r><a:rPr lang="en-US" sz="1200"></a:rPr><a:t>M2</a:t></a:r><a:endParaRPr/></a:p></a:txBody><a:tcPr/></a:tc><a:tc><a:txBody><a:bodyPr bIns="46800" lIns="90000" rIns="90000" tIns="46800" wrap="none"/><a:p><a:r><a:rPr lang="en-US" sz="1200"></a:rPr><a:t>M3</a:t></a:r><a:endParaRPr/></a:p></a:txBody><a:tcPr/></a:tc><a:tc><a:txBody><a:bodyPr bIns="46800" lIns="90000" rIns="90000" tIns="46800" wrap="none"/><a:p><a:r><a:rPr lang="en-US" sz="1200"></a:rPr><a:t>M4</a:t></a:r><a:endParaRPr/></a:p></a:txBody><a:tcPr/></a:tc><a:tc><a:txBody><a:bodyPr bIns="46800" lIns="90000" rIns="90000" tIns="46800" wrap="none"/><a:p><a:r><a:rPr lang="en-US" sz="1200"></a:rPr><a:t>M5</a:t></a:r><a:endParaRPr/></a:p></a:txBody><a:tcPr/></a:tc><a:tc><a:txBody><a:bodyPr bIns="46800" lIns="90000" rIns="90000" tIns="46800" wrap="none"/><a:p><a:r><a:rPr lang="en-US" sz="1200"></a:rPr><a:t>M6</a:t></a:r><a:endParaRPr/></a:p></a:txBody><a:tcPr/></a:tc><a:tc><a:txBody><a:bodyPr bIns="46800" lIns="90000" rIns="90000" tIns="46800" wrap="none"/><a:p><a:r><a:rPr lang="en-US" sz="1200"></a:rPr><a:t>M7</a:t></a:r><a:endParaRPr/></a:p></a:txBody><a:tcPr/></a:tc><a:tc><a:txBody><a:bodyPr bIns="46800" lIns="90000" rIns="90000" tIns="46800" wrap="none"/><a:p><a:r><a:rPr lang="en-US" sz="1200"></a:rPr><a:t>M8</a:t></a:r><a:endParaRPr/></a:p></a:txBody><a:tcPr/></a:tc><a:tc><a:txBody><a:bodyPr bIns="46800" lIns="90000" rIns="90000" tIns="46800" wrap="none"/><a:p><a:r><a:rPr lang="en-US" sz="1100"></a:rPr><a:t>Defects/KLOC</a:t></a:r><a:endParaRPr/></a:p></a:txBody><a:tcPr/></a:tc></a:tr><a:tr h="308160"><a:tc><a:txBody><a:bodyPr bIns="46800" lIns="90000" rIns="90000" tIns="46800" wrap="none"/><a:p><a:r><a:rPr lang="en-US" sz="1200"></a:rPr><a:t>M1</a:t></a:r><a:endParaRPr/></a:p></a:txBody><a:tcPr/></a:tc><a:tc><a:txBody><a:bodyPr bIns="46800" lIns="90000" rIns="90000" tIns="46800" wrap="none"/><a:p><a:r><a:rPr lang="en-US" sz="1200"></a:rPr><a:t>1.0</a:t></a:r><a:endParaRPr/></a:p></a:txBody><a:tcPr/></a:tc><a:tc><a:txBody><a:bodyPr bIns="46800" lIns="90000" rIns="90000" tIns="46800" wrap="none"/><a:p><a:r><a:rPr lang="en-US" sz="1200"></a:rPr><a:t>.834</a:t></a:r><a:endParaRPr/></a:p></a:txBody><a:tcPr/></a:tc><a:tc><a:txBody><a:bodyPr bIns="46800" lIns="90000" rIns="90000" tIns="46800" wrap="none"/><a:p><a:r><a:rPr lang="en-US" sz="1200"></a:rPr><a:t>.795</a:t></a:r><a:endParaRPr/></a:p></a:txBody><a:tcPr/></a:tc><a:tc><a:txBody><a:bodyPr bIns="46800" lIns="90000" rIns="90000" tIns="46800" wrap="none"/><a:p><a:r><a:rPr lang="en-US" sz="1200"></a:rPr><a:t>.413</a:t></a:r><a:endParaRPr/></a:p></a:txBody><a:tcPr/></a:tc><a:tc><a:txBody><a:bodyPr bIns="46800" lIns="90000" rIns="90000" tIns="46800" wrap="none"/><a:p><a:r><a:rPr lang="en-US" sz="1200"></a:rPr><a:t>.707</a:t></a:r><a:endParaRPr/></a:p></a:txBody><a:tcPr/></a:tc><a:tc><a:txBody><a:bodyPr bIns="46800" lIns="90000" rIns="90000" tIns="46800" wrap="none"/><a:p><a:r><a:rPr lang="en-US" sz="1200"></a:rPr><a:t>.651</a:t></a:r><a:endParaRPr/></a:p></a:txBody><a:tcPr/></a:tc><a:tc><a:txBody><a:bodyPr bIns="46800" lIns="90000" rIns="90000" tIns="46800" wrap="none"/><a:p><a:r><a:rPr lang="en-US" sz="1200"></a:rPr><a:t>.466</a:t></a:r><a:endParaRPr/></a:p></a:txBody><a:tcPr/></a:tc><a:tc><a:txBody><a:bodyPr bIns="46800" lIns="90000" rIns="90000" tIns="46800" wrap="none"/><a:p><a:r><a:rPr lang="en-US" sz="1200"></a:rPr><a:t>.588</a:t></a:r><a:endParaRPr/></a:p></a:txBody><a:tcPr/></a:tc><a:tc><a:txBody><a:bodyPr bIns="46800" lIns="90000" rIns="90000" tIns="46800" wrap="none"/><a:p><a:r><a:rPr lang="en-US" sz="1200"></a:rPr><a:t>.883</a:t></a:r><a:endParaRPr/></a:p></a:txBody><a:tcPr/></a:tc></a:tr><a:tr h="308160"><a:tc><a:txBody><a:bodyPr bIns="46800" lIns="90000" rIns="90000" tIns="46800" wrap="none"/><a:p><a:r><a:rPr lang="en-US" sz="1200"></a:rPr><a:t>M2</a:t></a:r><a:endParaRPr/></a:p></a:txBody><a:tcPr/></a:tc><a:tc><a:tcPr/></a:tc><a:tc><a:txBody><a:bodyPr bIns="46800" lIns="90000" rIns="90000" tIns="46800" wrap="none"/><a:p><a:r><a:rPr lang="en-US" sz="1200"></a:rPr><a:t>1.0</a:t></a:r><a:endParaRPr/></a:p></a:txBody><a:tcPr/></a:tc><a:tc><a:txBody><a:bodyPr bIns="46800" lIns="90000" rIns="90000" tIns="46800" wrap="none"/><a:p><a:r><a:rPr lang="en-US" sz="1200"></a:rPr><a:t>.645</a:t></a:r><a:endParaRPr/></a:p></a:txBody><a:tcPr/></a:tc><a:tc><a:txBody><a:bodyPr bIns="46800" lIns="90000" rIns="90000" tIns="46800" wrap="none"/><a:p><a:r><a:rPr lang="en-US" sz="1200"></a:rPr><a:t>.553</a:t></a:r><a:endParaRPr/></a:p></a:txBody><a:tcPr/></a:tc><a:tc><a:txBody><a:bodyPr bIns="46800" lIns="90000" rIns="90000" tIns="46800" wrap="none"/><a:p><a:r><a:rPr lang="en-US" sz="1200"></a:rPr><a:t>.747</a:t></a:r><a:endParaRPr/></a:p></a:txBody><a:tcPr/></a:tc><a:tc><a:txBody><a:bodyPr bIns="46800" lIns="90000" rIns="90000" tIns="46800" wrap="none"/><a:p><a:r><a:rPr lang="en-US" sz="1200"></a:rPr><a:t>.446</a:t></a:r><a:endParaRPr/></a:p></a:txBody><a:tcPr/></a:tc><a:tc><a:txBody><a:bodyPr bIns="46800" lIns="90000" rIns="90000" tIns="46800" wrap="none"/><a:p><a:r><a:rPr lang="en-US" sz="1200"></a:rPr><a:t>.219</a:t></a:r><a:endParaRPr/></a:p></a:txBody><a:tcPr/></a:tc><a:tc><a:txBody><a:bodyPr bIns="46800" lIns="90000" rIns="90000" tIns="46800" wrap="none"/><a:p><a:r><a:rPr lang="en-US" sz="1200"></a:rPr><a:t>.492</a:t></a:r><a:endParaRPr/></a:p></a:txBody><a:tcPr/></a:tc><a:tc><a:txBody><a:bodyPr bIns="46800" lIns="90000" rIns="90000" tIns="46800" wrap="none"/><a:p><a:r><a:rPr lang="en-US" sz="1200"></a:rPr><a:t>.798</a:t></a:r><a:endParaRPr/></a:p></a:txBody><a:tcPr/></a:tc></a:tr><a:tr h="308160"><a:tc><a:txBody><a:bodyPr bIns="46800" lIns="90000" rIns="90000" tIns="46800" wrap="none"/><a:p><a:r><a:rPr lang="en-US" sz="1200"></a:rPr><a:t>M3</a:t></a:r><a:endParaRPr/></a:p></a:txBody><a:tcPr/></a:tc><a:tc><a:tcPr/></a:tc><a:tc><a:tcPr/></a:tc><a:tc><a:txBody><a:bodyPr bIns="46800" lIns="90000" rIns="90000" tIns="46800" wrap="none"/><a:p><a:r><a:rPr lang="en-US" sz="1200"></a:rPr><a:t>1.0</a:t></a:r><a:endParaRPr/></a:p></a:txBody><a:tcPr/></a:tc><a:tc><a:txBody><a:bodyPr bIns="46800" lIns="90000" rIns="90000" tIns="46800" wrap="none"/><a:p><a:r><a:rPr lang="en-US" sz="1200"></a:rPr><a:t>.186</a:t></a:r><a:endParaRPr/></a:p></a:txBody><a:tcPr/></a:tc><a:tc><a:txBody><a:bodyPr bIns="46800" lIns="90000" rIns="90000" tIns="46800" wrap="none"/><a:p><a:r><a:rPr lang="en-US" sz="1200"></a:rPr><a:t>.749</a:t></a:r><a:endParaRPr/></a:p></a:txBody><a:tcPr/></a:tc><a:tc><a:txBody><a:bodyPr bIns="46800" lIns="90000" rIns="90000" tIns="46800" wrap="none"/><a:p><a:r><a:rPr lang="en-US" sz="1200"></a:rPr><a:t>.434</a:t></a:r><a:endParaRPr/></a:p></a:txBody><a:tcPr/></a:tc><a:tc><a:txBody><a:bodyPr bIns="46800" lIns="90000" rIns="90000" tIns="46800" wrap="none"/><a:p><a:r><a:rPr lang="en-US" sz="1200"></a:rPr><a:t>.445</a:t></a:r><a:endParaRPr/></a:p></a:txBody><a:tcPr/></a:tc><a:tc><a:txBody><a:bodyPr bIns="46800" lIns="90000" rIns="90000" tIns="46800" wrap="none"/><a:p><a:r><a:rPr lang="en-US" sz="1200"></a:rPr><a:t>.269</a:t></a:r><a:endParaRPr/></a:p></a:txBody><a:tcPr/></a:tc><a:tc><a:txBody><a:bodyPr bIns="46800" lIns="90000" rIns="90000" tIns="46800" wrap="none"/><a:p><a:r><a:rPr lang="en-US" sz="1200"></a:rPr><a:t>.868</a:t></a:r><a:endParaRPr/></a:p></a:txBody><a:tcPr/></a:tc></a:tr><a:tr h="308160"><a:tc><a:txBody><a:bodyPr bIns="46800" lIns="90000" rIns="90000" tIns="46800" wrap="none"/><a:p><a:r><a:rPr lang="en-US" sz="1200"></a:rPr><a:t>M4</a:t></a:r><a:endParaRPr/></a:p></a:txBody><a:tcPr/></a:tc><a:tc><a:tcPr/></a:tc><a:tc><a:tcPr/></a:tc><a:tc><a:tcPr/></a:tc><a:tc><a:txBody><a:bodyPr bIns="46800" lIns="90000" rIns="90000" tIns="46800" wrap="none"/><a:p><a:r><a:rPr lang="en-US" sz="1200"></a:rPr><a:t>1.0</a:t></a:r><a:endParaRPr/></a:p></a:txBody><a:tcPr/></a:tc><a:tc><a:txBody><a:bodyPr bIns="46800" lIns="90000" rIns="90000" tIns="46800" wrap="none"/><a:p><a:r><a:rPr lang="en-US" sz="1200"></a:rPr><a:t>.531</a:t></a:r><a:endParaRPr/></a:p></a:txBody><a:tcPr/></a:tc><a:tc><a:txBody><a:bodyPr bIns="46800" lIns="90000" rIns="90000" tIns="46800" wrap="none"/><a:p><a:r><a:rPr lang="en-US" sz="1200"></a:rPr><a:t>.429</a:t></a:r><a:endParaRPr/></a:p></a:txBody><a:tcPr/></a:tc><a:tc><a:txBody><a:bodyPr bIns="46800" lIns="90000" rIns="90000" tIns="46800" wrap="none"/><a:p><a:r><a:rPr lang="en-US" sz="1200"></a:rPr><a:t>.210</a:t></a:r><a:endParaRPr/></a:p></a:txBody><a:tcPr/></a:tc><a:tc><a:txBody><a:bodyPr bIns="46800" lIns="90000" rIns="90000" tIns="46800" wrap="none"/><a:p><a:r><a:rPr lang="en-US" sz="1200"></a:rPr><a:t>.631</a:t></a:r><a:endParaRPr/></a:p></a:txBody><a:tcPr/></a:tc><a:tc><a:txBody><a:bodyPr bIns="46800" lIns="90000" rIns="90000" tIns="46800" wrap="none"/><a:p><a:r><a:rPr lang="en-US" sz="1200"></a:rPr><a:t>.288</a:t></a:r><a:endParaRPr/></a:p></a:txBody><a:tcPr/></a:tc></a:tr><a:tr h="308160"><a:tc><a:txBody><a:bodyPr bIns="46800" lIns="90000" rIns="90000" tIns="46800" wrap="none"/><a:p><a:r><a:rPr lang="en-US" sz="1200"></a:rPr><a:t>M5</a:t></a:r><a:endParaRPr/></a:p></a:txBody><a:tcPr/></a:tc><a:tc><a:tcPr/></a:tc><a:tc><a:tcPr/></a:tc><a:tc><a:tcPr/></a:tc><a:tc><a:tcPr/></a:tc><a:tc><a:txBody><a:bodyPr bIns="46800" lIns="90000" rIns="90000" tIns="46800" wrap="none"/><a:p><a:r><a:rPr lang="en-US" sz="1200"></a:rPr><a:t>1.0</a:t></a:r><a:endParaRPr/></a:p></a:txBody><a:tcPr/></a:tc><a:tc><a:txBody><a:bodyPr bIns="46800" lIns="90000" rIns="90000" tIns="46800" wrap="none"/><a:p><a:r><a:rPr lang="en-US" sz="1200"></a:rPr><a:t>.263</a:t></a:r><a:endParaRPr/></a:p></a:txBody><a:tcPr/></a:tc><a:tc><a:txBody><a:bodyPr bIns="46800" lIns="90000" rIns="90000" tIns="46800" wrap="none"/><a:p><a:r><a:rPr lang="en-US" sz="1200"></a:rPr><a:t>.201</a:t></a:r><a:endParaRPr/></a:p></a:txBody><a:tcPr/></a:tc><a:tc><a:txBody><a:bodyPr bIns="46800" lIns="90000" rIns="90000" tIns="46800" wrap="none"/><a:p><a:r><a:rPr lang="en-US" sz="1200"></a:rPr><a:t>.390</a:t></a:r><a:endParaRPr/></a:p></a:txBody><a:tcPr/></a:tc><a:tc><a:txBody><a:bodyPr bIns="46800" lIns="90000" rIns="90000" tIns="46800" wrap="none"/><a:p><a:r><a:rPr lang="en-US" sz="1200"></a:rPr><a:t>.729</a:t></a:r><a:endParaRPr/></a:p></a:txBody><a:tcPr/></a:tc></a:tr><a:tr h="308160"><a:tc><a:txBody><a:bodyPr bIns="46800" lIns="90000" rIns="90000" tIns="46800" wrap="none"/><a:p><a:r><a:rPr lang="en-US" sz="1200"></a:rPr><a:t>M6</a:t></a:r><a:endParaRPr/></a:p></a:txBody><a:tcPr/></a:tc><a:tc><a:tcPr/></a:tc><a:tc><a:tcPr/></a:tc><a:tc><a:tcPr/></a:tc><a:tc><a:tcPr/></a:tc><a:tc><a:tcPr/></a:tc><a:tc><a:txBody><a:bodyPr bIns="46800" lIns="90000" rIns="90000" tIns="46800" wrap="none"/><a:p><a:r><a:rPr lang="en-US" sz="1200"></a:rPr><a:t>1.0</a:t></a:r><a:endParaRPr/></a:p></a:txBody><a:tcPr/></a:tc><a:tc><a:txBody><a:bodyPr bIns="46800" lIns="90000" rIns="90000" tIns="46800" wrap="none"/><a:p><a:r><a:rPr lang="en-US" sz="1200"></a:rPr><a:t>.701</a:t></a:r><a:endParaRPr/></a:p></a:txBody><a:tcPr/></a:tc><a:tc><a:txBody><a:bodyPr bIns="46800" lIns="90000" rIns="90000" tIns="46800" wrap="none"/><a:p><a:r><a:rPr lang="en-US" sz="1200"></a:rPr><a:t>.843</a:t></a:r><a:endParaRPr/></a:p></a:txBody><a:tcPr/></a:tc><a:tc><a:txBody><a:bodyPr bIns="46800" lIns="90000" rIns="90000" tIns="46800" wrap="none"/><a:p><a:r><a:rPr lang="en-US" sz="1200"></a:rPr><a:t>.374</a:t></a:r><a:endParaRPr/></a:p></a:txBody><a:tcPr/></a:tc></a:tr><a:tr h="308160"><a:tc><a:txBody><a:bodyPr bIns="46800" lIns="90000" rIns="90000" tIns="46800" wrap="none"/><a:p><a:r><a:rPr lang="en-US" sz="1200"></a:rPr><a:t>M7</a:t></a:r><a:endParaRPr/></a:p></a:txBody><a:tcPr/></a:tc><a:tc><a:tcPr/></a:tc><a:tc><a:tcPr/></a:tc><a:tc><a:tcPr/></a:tc><a:tc><a:tcPr/></a:tc><a:tc><a:tcPr/></a:tc><a:tc><a:tcPr/></a:tc><a:tc><a:txBody><a:bodyPr bIns="46800" lIns="90000" rIns="90000" tIns="46800" wrap="none"/><a:p><a:r><a:rPr lang="en-US" sz="1200"></a:rPr><a:t>1.0</a:t></a:r><a:endParaRPr/></a:p></a:txBody><a:tcPr/></a:tc><a:tc><a:txBody><a:bodyPr bIns="46800" lIns="90000" rIns="90000" tIns="46800" wrap="none"/><a:p><a:r><a:rPr lang="en-US" sz="1200"></a:rPr><a:t>.507</a:t></a:r><a:endParaRPr/></a:p></a:txBody><a:tcPr/></a:tc><a:tc><a:txBody><a:bodyPr bIns="46800" lIns="90000" rIns="90000" tIns="46800" wrap="none"/><a:p><a:r><a:rPr lang="en-US" sz="1200"></a:rPr><a:t>.288</a:t></a:r><a:endParaRPr/></a:p></a:txBody><a:tcPr/></a:tc></a:tr><a:tr h="308160"><a:tc><a:txBody><a:bodyPr bIns="46800" lIns="90000" rIns="90000" tIns="46800" wrap="none"/><a:p><a:r><a:rPr lang="en-US" sz="1200"></a:rPr><a:t>M8</a:t></a:r><a:endParaRPr/></a:p></a:txBody><a:tcPr/></a:tc><a:tc><a:tcPr/></a:tc><a:tc><a:tcPr/></a:tc><a:tc><a:tcPr/></a:tc><a:tc><a:tcPr/></a:tc><a:tc><a:tcPr/></a:tc><a:tc><a:tcPr/></a:tc><a:tc><a:tcPr/></a:tc><a:tc><a:txBody><a:bodyPr bIns="46800" lIns="90000" rIns="90000" tIns="46800" wrap="none"/><a:p><a:r><a:rPr lang="en-US" sz="1200"></a:rPr><a:t>1.0</a:t></a:r><a:endParaRPr/></a:p></a:txBody><a:tcPr/></a:tc><a:tc><a:txBody><a:bodyPr bIns="46800" lIns="90000" rIns="90000" tIns="46800" wrap="none"/><a:p><a:r><a:rPr lang="en-US" sz="1200"></a:rPr><a:t>.262</a:t></a:r><a:endParaRPr/></a:p></a:txBody><a:tcPr/></a:tc></a:tr><a:tr h="304920"><a:tc><a:txBody><a:bodyPr bIns="46800" lIns="90000" rIns="90000" tIns="46800" wrap="none"/><a:p><a:r><a:rPr lang="en-US" sz="1100"></a:rPr><a:t>Defects/KLOC</a:t></a:r><a:endParaRPr/></a:p></a:txBody><a:tcPr/></a:tc><a:tc><a:tcPr/></a:tc><a:tc><a:tcPr/></a:tc><a:tc><a:tcPr/></a:tc><a:tc><a:tcPr/></a:tc><a:tc><a:tcPr/></a:tc><a:tc><a:tcPr/></a:tc><a:tc><a:tcPr/></a:tc><a:tc><a:tcPr/></a:tc><a:tc><a:txBody><a:bodyPr bIns="46800" lIns="90000" rIns="90000" tIns="46800" wrap="none"/><a:p><a:r><a:rPr lang="en-US" sz="1200"></a:rPr><a:t>1.0</a:t></a:r><a:endParaRPr/></a:p></a:txBody><a:tcPr/></a:tc></a:tr></a:tbl></a:graphicData></a:graphic></p:graphicFrame></p:spTree></p:cSld><p:timing><p:tnLst><p:par><p:cTn dur="indefinite" id="51" nodeType="tmRoot" restart="never"><p:childTnLst><p:seq><p:cTn id="52" nodeType="mainSeq"><p:childTnLst><p:par><p:cTn fill="freeze" id="53"><p:stCondLst><p:cond delay="indefinite"/></p:stCondLst><p:childTnLst><p:par><p:cTn fill="freeze" id="54"><p:stCondLst><p:cond delay="0"/></p:stCondLst><p:childTnLst><p:par><p:cTn fill="hold" id="55" nodeType="clickEffect" presetClass="entr" presetID="20"><p:stCondLst><p:cond delay="0"/></p:stCondLst><p:childTnLst><p:set><p:cBhvr><p:cTn dur="1" fill="hold" id="56"><p:stCondLst><p:cond delay="0"/></p:stCondLst></p:cTn><p:tgtEl><p:spTgt spid="154"></p:spTgt></p:tgtEl><p:attrNameLst><p:attrName>style.visibility</p:attrName></p:attrNameLst></p:cBhvr><p:to><p:strVal val="visible"/></p:to></p:set><p:animEffect filter="wedge" transition="in"><p:cBhvr additive="repl"><p:cTn dur="2000" fill="freeze" id="57"></p:cTn><p:tgtEl><p:spTgt spid="154"></p:spTgt></p:tgtEl></p:cBhvr></p:animEffect></p:childTnLst></p:cTn></p:par></p:childTnLst></p:cTn></p:par></p:childTnLst></p:cTn></p:par><p:par><p:cTn fill="freeze" id="58"><p:stCondLst><p:cond delay="indefinite"/></p:stCondLst><p:childTnLst><p:par><p:cTn fill="freeze" id="59"><p:stCondLst><p:cond delay="0"/></p:stCondLst><p:childTnLst><p:par><p:cTn fill="hold" id="60" nodeType="clickEffect" presetClass="entr" presetID="2" presetSubtype="4"><p:stCondLst><p:cond delay="0"/></p:stCondLst><p:childTnLst><p:set><p:cBhvr><p:cTn dur="1" fill="hold" id="61"><p:stCondLst><p:cond delay="0"/></p:stCondLst></p:cTn><p:tgtEl><p:spTgt spid="-1"></p:spTgt></p:tgtEl><p:attrNameLst><p:attrName>style.visibility</p:attrName></p:attrNameLst></p:cBhvr><p:to><p:strVal val="visible"/></p:to></p:set><p:anim calcmode="lin" valueType="num"><p:cBhvr additive="repl"><p:cTn dur="500" fill="hold" id="62"></p:cTn><p:tgtEl><p:spTgt spid="-1"></p:spTgt></p:tgtEl><p:attrNameLst><p:attrName>ppt_x</p:attrName></p:attrNameLst></p:cBhvr><p:tavLst><p:tav tm="0"><p:val><p:strVal val="#ppt_x"/></p:val></p:tav><p:tav tm="100000"><p:val><p:strVal val="#ppt_x"/></p:val></p:tav></p:tavLst></p:anim><p:anim calcmode="lin" valueType="num"><p:cBhvr additive="repl"><p:cTn dur="500" fill="hold" id="63"></p:cTn><p:tgtEl><p:spTgt spid="-1"></p:spTgt></p:tgtEl><p:attrNameLst><p:attrName>ppt_y</p:attrName></p:attrNameLst></p:cBhvr><p:tavLst><p:tav tm="0"><p:val><p:strVal val="1+#ppt_h/2"/></p:val></p:tav><p:tav tm="100000"><p:val><p:strVal val="#ppt_y"/></p:val></p:tav></p:tavLst></p:anim></p:childTnLst></p:cTn></p:par></p:childTnLst></p:cTn></p:par></p:childTnLst></p:cTn></p:par></p:childTnLst></p:cTn><p:prevCondLst><p:cond delay="0" evt="onPrev"><p:tgtEl><p:sldTgt/></p:tgtEl></p:cond></p:prevCondLst><p:nextCondLst><p:cond delay="0" evt="onNext"><p:tgtEl><p:sldTgt/></p:tgtEl></p:cond></p:nextCondLst></p:seq></p:childTnLst></p:cTn></p:par></p:tnLst></p:timing></p:sld>
 </file>
 
 <file path=ppt/slides/slide8.xml><?xml version="1.0" encoding="utf-8"?>
@@ -8408,7 +8652,7 @@
       </p:grpSpPr>
       <p:sp>
         <p:nvSpPr>
-          <p:cNvPr id="153" name="TextShape 1"/>
+          <p:cNvPr id="155" name="TextShape 1"/>
           <p:cNvSpPr txBox="1"/>
           <p:nvPr/>
         </p:nvSpPr>
@@ -8435,13 +8679,13 @@
       </p:sp>
       <p:sp>
         <p:nvSpPr>
-          <p:cNvPr id="154" name="CustomShape 2"/>
+          <p:cNvPr id="156" name="CustomShape 2"/>
           <p:cNvSpPr/>
           <p:nvPr/>
         </p:nvSpPr>
         <p:spPr>
           <a:xfrm>
-            <a:off x="5486400" y="3200400"/>
+            <a:off x="5558400" y="3164400"/>
             <a:ext cx="640080" cy="365760"/>
           </a:xfrm>
           <a:prstGeom prst="ellipse">
@@ -8470,13 +8714,13 @@
       </p:sp>
       <p:sp>
         <p:nvSpPr>
-          <p:cNvPr id="155" name="CustomShape 3"/>
+          <p:cNvPr id="157" name="CustomShape 3"/>
           <p:cNvSpPr/>
           <p:nvPr/>
         </p:nvSpPr>
         <p:spPr>
           <a:xfrm>
-            <a:off x="5486400" y="4663440"/>
+            <a:off x="5558400" y="4627440"/>
             <a:ext cx="640080" cy="365760"/>
           </a:xfrm>
           <a:prstGeom prst="ellipse">
@@ -8505,13 +8749,13 @@
       </p:sp>
       <p:sp>
         <p:nvSpPr>
-          <p:cNvPr id="156" name="CustomShape 4"/>
+          <p:cNvPr id="158" name="CustomShape 4"/>
           <p:cNvSpPr/>
           <p:nvPr/>
         </p:nvSpPr>
         <p:spPr>
           <a:xfrm>
-            <a:off x="2972520" y="3854520"/>
+            <a:off x="3044520" y="3818520"/>
             <a:ext cx="640080" cy="365760"/>
           </a:xfrm>
           <a:prstGeom prst="ellipse">
@@ -8540,16 +8784,16 @@
       </p:sp>
       <p:cxnSp>
         <p:nvCxnSpPr>
-          <p:cNvPr id="157" name="Line 5"/>
+          <p:cNvPr id="159" name="Line 5"/>
           <p:cNvCxnSpPr>
-            <a:stCxn id="156" idx="5"/>
-            <a:endCxn id="155" idx="2"/>
+            <a:stCxn id="158" idx="5"/>
+            <a:endCxn id="157" idx="2"/>
           </p:cNvCxnSpPr>
           <p:nvPr/>
         </p:nvCxnSpPr>
         <p:spPr>
           <xfrm>
-            <a:off x="3519000" y="4167000"/>
+            <a:off x="3591000" y="4131000"/>
             <a:ext cx="1967760" cy="679680"/>
           </xfrm>
           <a:prstGeom prst="straightConnector1">
@@ -8566,16 +8810,16 @@
       </p:cxnSp>
       <p:cxnSp>
         <p:nvCxnSpPr>
-          <p:cNvPr id="158" name="Line 6"/>
+          <p:cNvPr id="160" name="Line 6"/>
           <p:cNvCxnSpPr>
-            <a:stCxn id="156" idx="7"/>
-            <a:endCxn id="154" idx="2"/>
+            <a:stCxn id="158" idx="7"/>
+            <a:endCxn id="156" idx="2"/>
           </p:cNvCxnSpPr>
           <p:nvPr/>
         </p:nvCxnSpPr>
         <p:spPr>
           <xfrm flipH="1">
-            <a:off x="3519000" y="3383280"/>
+            <a:off x="3591000" y="3347280"/>
             <a:ext cx="1967760" cy="524880"/>
           </xfrm>
           <a:prstGeom prst="straightConnector1">
@@ -8592,16 +8836,16 @@
       </p:cxnSp>
       <p:cxnSp>
         <p:nvCxnSpPr>
-          <p:cNvPr id="159" name="Line 7"/>
+          <p:cNvPr id="161" name="Line 7"/>
           <p:cNvCxnSpPr>
-            <a:stCxn id="154" idx="4"/>
-            <a:endCxn id="155" idx="0"/>
+            <a:stCxn id="156" idx="4"/>
+            <a:endCxn id="157" idx="0"/>
           </p:cNvCxnSpPr>
           <p:nvPr/>
         </p:nvCxnSpPr>
         <p:spPr>
           <xfrm>
-            <a:off x="5806440" y="3566160"/>
+            <a:off x="5878440" y="3530160"/>
             <a:ext cx="360" cy="1097640"/>
           </xfrm>
           <a:prstGeom prst="straightConnector1">
@@ -8618,13 +8862,13 @@
       </p:cxnSp>
       <p:sp>
         <p:nvSpPr>
-          <p:cNvPr id="160" name="TextShape 8"/>
+          <p:cNvPr id="162" name="TextShape 8"/>
           <p:cNvSpPr txBox="1"/>
           <p:nvPr/>
         </p:nvSpPr>
         <p:spPr>
           <a:xfrm>
-            <a:off x="4053600" y="3219840"/>
+            <a:off x="4125600" y="3183840"/>
             <a:ext cx="822960" cy="316080"/>
           </a:xfrm>
           <a:prstGeom prst="rect">
@@ -8648,13 +8892,13 @@
       </p:sp>
       <p:sp>
         <p:nvSpPr>
-          <p:cNvPr id="161" name="TextShape 9"/>
+          <p:cNvPr id="163" name="TextShape 9"/>
           <p:cNvSpPr txBox="1"/>
           <p:nvPr/>
         </p:nvSpPr>
         <p:spPr>
           <a:xfrm>
-            <a:off x="6000480" y="3958920"/>
+            <a:off x="6072480" y="3922920"/>
             <a:ext cx="822960" cy="316080"/>
           </a:xfrm>
           <a:prstGeom prst="rect">
@@ -8678,13 +8922,13 @@
       </p:sp>
       <p:sp>
         <p:nvSpPr>
-          <p:cNvPr id="162" name="TextShape 10"/>
+          <p:cNvPr id="164" name="TextShape 10"/>
           <p:cNvSpPr txBox="1"/>
           <p:nvPr/>
         </p:nvSpPr>
         <p:spPr>
           <a:xfrm>
-            <a:off x="4053600" y="4659840"/>
+            <a:off x="4125600" y="4623840"/>
             <a:ext cx="822960" cy="316080"/>
           </a:xfrm>
           <a:prstGeom prst="rect">
@@ -8708,13 +8952,13 @@
       </p:sp>
       <p:sp>
         <p:nvSpPr>
-          <p:cNvPr id="163" name="TextShape 11"/>
+          <p:cNvPr id="165" name="TextShape 11"/>
           <p:cNvSpPr txBox="1"/>
           <p:nvPr/>
         </p:nvSpPr>
         <p:spPr>
           <a:xfrm>
-            <a:off x="1280160" y="2079720"/>
+            <a:off x="1280160" y="2043720"/>
             <a:ext cx="7772400" cy="715320"/>
           </a:xfrm>
           <a:prstGeom prst="rect">
@@ -8775,13 +9019,13 @@
       </p:sp>
       <p:sp>
         <p:nvSpPr>
-          <p:cNvPr id="164" name="TextShape 12"/>
+          <p:cNvPr id="166" name="TextShape 12"/>
           <p:cNvSpPr txBox="1"/>
           <p:nvPr/>
         </p:nvSpPr>
         <p:spPr>
           <a:xfrm>
-            <a:off x="1463040" y="5456160"/>
+            <a:off x="1319040" y="5456160"/>
             <a:ext cx="5577840" cy="1027800"/>
           </a:xfrm>
           <a:prstGeom prst="rect">
@@ -8850,7 +9094,7 @@
       </p:sp>
       <p:sp>
         <p:nvSpPr>
-          <p:cNvPr id="165" name="TextShape 13"/>
+          <p:cNvPr id="167" name="TextShape 13"/>
           <p:cNvSpPr txBox="1"/>
           <p:nvPr/>
         </p:nvSpPr>
@@ -8883,10 +9127,10 @@
   <p:timing>
     <p:tnLst>
       <p:par>
-        <p:cTn dur="indefinite" id="68" nodeType="tmRoot" restart="never">
+        <p:cTn dur="indefinite" id="64" nodeType="tmRoot" restart="never">
           <p:childTnLst>
             <p:seq>
-              <p:cTn id="69" nodeType="mainSeq">
+              <p:cTn id="65" nodeType="mainSeq">
                 <p:childTnLst/>
               </p:cTn>
               <p:prevCondLst>
@@ -8931,7 +9175,7 @@
       </p:grpSpPr>
       <p:sp>
         <p:nvSpPr>
-          <p:cNvPr id="166" name="TextShape 1"/>
+          <p:cNvPr id="168" name="TextShape 1"/>
           <p:cNvSpPr txBox="1"/>
           <p:nvPr/>
         </p:nvSpPr>
@@ -8958,13 +9202,13 @@
       </p:sp>
       <p:sp>
         <p:nvSpPr>
-          <p:cNvPr id="167" name="TextShape 2"/>
+          <p:cNvPr id="169" name="TextShape 2"/>
           <p:cNvSpPr txBox="1"/>
           <p:nvPr/>
         </p:nvSpPr>
         <p:spPr>
           <a:xfrm>
-            <a:off x="504000" y="1733040"/>
+            <a:off x="504000" y="1661040"/>
             <a:ext cx="9071640" cy="5079960"/>
           </a:xfrm>
           <a:prstGeom prst="rect">
@@ -9041,7 +9285,7 @@
             </a:pPr>
             <a:r>
               <a:rPr lang="en-US" sz="2800"/>
-              <a:t>Coefficient of Ditermination:</a:t>
+              <a:t>Coefficient of Determination:</a:t>
             </a:r>
             <a:endParaRPr/>
           </a:p>
@@ -9081,7 +9325,7 @@
       </p:sp>
       <p:sp>
         <p:nvSpPr>
-          <p:cNvPr id="168" name="TextShape 3"/>
+          <p:cNvPr id="170" name="TextShape 3"/>
           <p:cNvSpPr txBox="1"/>
           <p:nvPr/>
         </p:nvSpPr>
@@ -9111,6 +9355,35 @@
       </p:sp>
     </p:spTree>
   </p:cSld>
+  <p:timing>
+    <p:tnLst>
+      <p:par>
+        <p:cTn dur="indefinite" id="66" nodeType="tmRoot" restart="never">
+          <p:childTnLst>
+            <p:seq>
+              <p:cTn id="67" nodeType="mainSeq">
+                <p:childTnLst/>
+              </p:cTn>
+              <p:prevCondLst>
+                <p:cond delay="0" evt="onPrev">
+                  <p:tgtEl>
+                    <p:sldTgt/>
+                  </p:tgtEl>
+                </p:cond>
+              </p:prevCondLst>
+              <p:nextCondLst>
+                <p:cond delay="0" evt="onNext">
+                  <p:tgtEl>
+                    <p:sldTgt/>
+                  </p:tgtEl>
+                </p:cond>
+              </p:nextCondLst>
+            </p:seq>
+          </p:childTnLst>
+        </p:cTn>
+      </p:par>
+    </p:tnLst>
+  </p:timing>
 </p:sld>
 </file>
 

</xml_diff>